<commit_message>
Add assets and re-organize
</commit_message>
<xml_diff>
--- a/Week 7/BevsBakery.pptx
+++ b/Week 7/BevsBakery.pptx
@@ -9,6 +9,7 @@
     <p:sldId id="257" r:id="rId3"/>
     <p:sldId id="258" r:id="rId4"/>
     <p:sldId id="259" r:id="rId5"/>
+    <p:sldId id="260" r:id="rId6"/>
   </p:sldIdLst>
   <p:sldSz cx="12192000" cy="6858000"/>
   <p:notesSz cx="6858000" cy="9144000"/>
@@ -107,6 +108,11 @@
       </a:defRPr>
     </a:lvl9pPr>
   </p:defaultTextStyle>
+  <p:extLst>
+    <p:ext uri="{EFAFB233-063F-42B5-8137-9DF3F51BA10A}">
+      <p15:sldGuideLst xmlns:p15="http://schemas.microsoft.com/office/powerpoint/2012/main"/>
+    </p:ext>
+  </p:extLst>
 </p:presentation>
 </file>
 
@@ -8506,7 +8512,7 @@
         </p:blipFill>
         <p:spPr>
           <a:xfrm>
-            <a:off x="809053" y="1167977"/>
+            <a:off x="1020654" y="1179630"/>
             <a:ext cx="876190" cy="183354"/>
           </a:xfrm>
           <a:prstGeom prst="rect">
@@ -8536,7 +8542,7 @@
         </p:blipFill>
         <p:spPr>
           <a:xfrm>
-            <a:off x="847354" y="1648152"/>
+            <a:off x="1026842" y="1637037"/>
             <a:ext cx="876190" cy="180486"/>
           </a:xfrm>
           <a:prstGeom prst="rect">
@@ -8566,7 +8572,7 @@
         </p:blipFill>
         <p:spPr>
           <a:xfrm>
-            <a:off x="5129408" y="762351"/>
+            <a:off x="5759325" y="731896"/>
             <a:ext cx="798964" cy="1177960"/>
           </a:xfrm>
           <a:prstGeom prst="rect">
@@ -8596,7 +8602,7 @@
         </p:blipFill>
         <p:spPr>
           <a:xfrm>
-            <a:off x="2213674" y="1184704"/>
+            <a:off x="2624161" y="1177205"/>
             <a:ext cx="1193651" cy="215873"/>
           </a:xfrm>
           <a:prstGeom prst="rect">
@@ -8626,7 +8632,7 @@
         </p:blipFill>
         <p:spPr>
           <a:xfrm>
-            <a:off x="2213674" y="1662945"/>
+            <a:off x="2624161" y="1622054"/>
             <a:ext cx="1295238" cy="215873"/>
           </a:xfrm>
           <a:prstGeom prst="rect">
@@ -8656,7 +8662,7 @@
         </p:blipFill>
         <p:spPr>
           <a:xfrm>
-            <a:off x="8514152" y="1796278"/>
+            <a:off x="8933794" y="1751984"/>
             <a:ext cx="990476" cy="165079"/>
           </a:xfrm>
           <a:prstGeom prst="rect">
@@ -8686,7 +8692,7 @@
         </p:blipFill>
         <p:spPr>
           <a:xfrm>
-            <a:off x="8285581" y="1441080"/>
+            <a:off x="8686014" y="1473917"/>
             <a:ext cx="1447619" cy="203175"/>
           </a:xfrm>
           <a:prstGeom prst="rect">
@@ -8716,7 +8722,7 @@
         </p:blipFill>
         <p:spPr>
           <a:xfrm>
-            <a:off x="7227835" y="1148557"/>
+            <a:off x="7629961" y="1158964"/>
             <a:ext cx="1536508" cy="165079"/>
           </a:xfrm>
           <a:prstGeom prst="rect">
@@ -8746,7 +8752,7 @@
         </p:blipFill>
         <p:spPr>
           <a:xfrm>
-            <a:off x="8958598" y="1189811"/>
+            <a:off x="9378239" y="1200957"/>
             <a:ext cx="101587" cy="101587"/>
           </a:xfrm>
           <a:prstGeom prst="rect">
@@ -8776,7 +8782,7 @@
         </p:blipFill>
         <p:spPr>
           <a:xfrm>
-            <a:off x="8310979" y="850583"/>
+            <a:off x="8647167" y="850322"/>
             <a:ext cx="1498413" cy="203175"/>
           </a:xfrm>
           <a:prstGeom prst="rect">
@@ -8806,8 +8812,2508 @@
         </p:blipFill>
         <p:spPr>
           <a:xfrm>
-            <a:off x="9247664" y="1163561"/>
+            <a:off x="9761822" y="1163653"/>
             <a:ext cx="1409524" cy="203175"/>
+          </a:xfrm>
+          <a:prstGeom prst="rect">
+            <a:avLst/>
+          </a:prstGeom>
+        </p:spPr>
+      </p:pic>
+      <p:pic>
+        <p:nvPicPr>
+          <p:cNvPr id="29" name="Picture 28" descr="A kitchen with a table in a restaurant&#10;&#10;Description automatically generated">
+            <a:extLst>
+              <a:ext uri="{FF2B5EF4-FFF2-40B4-BE49-F238E27FC236}">
+                <a16:creationId xmlns:a16="http://schemas.microsoft.com/office/drawing/2014/main" id="{DC382F59-2C09-4894-8ED5-70D6E159753A}"/>
+              </a:ext>
+            </a:extLst>
+          </p:cNvPr>
+          <p:cNvPicPr>
+            <a:picLocks noChangeAspect="1"/>
+          </p:cNvPicPr>
+          <p:nvPr/>
+        </p:nvPicPr>
+        <p:blipFill>
+          <a:blip r:embed="rId23"/>
+          <a:stretch>
+            <a:fillRect/>
+          </a:stretch>
+        </p:blipFill>
+        <p:spPr>
+          <a:xfrm>
+            <a:off x="1020827" y="2881495"/>
+            <a:ext cx="10160000" cy="3405533"/>
+          </a:xfrm>
+          <a:prstGeom prst="rect">
+            <a:avLst/>
+          </a:prstGeom>
+        </p:spPr>
+      </p:pic>
+      <p:sp>
+        <p:nvSpPr>
+          <p:cNvPr id="31" name="TextBox 30">
+            <a:extLst>
+              <a:ext uri="{FF2B5EF4-FFF2-40B4-BE49-F238E27FC236}">
+                <a16:creationId xmlns:a16="http://schemas.microsoft.com/office/drawing/2014/main" id="{C7C790A2-6DD4-4A34-A4FB-A1F40600A22F}"/>
+              </a:ext>
+            </a:extLst>
+          </p:cNvPr>
+          <p:cNvSpPr txBox="1"/>
+          <p:nvPr/>
+        </p:nvSpPr>
+        <p:spPr>
+          <a:xfrm>
+            <a:off x="3029713" y="2127337"/>
+            <a:ext cx="6346353" cy="769441"/>
+          </a:xfrm>
+          <a:prstGeom prst="rect">
+            <a:avLst/>
+          </a:prstGeom>
+          <a:noFill/>
+        </p:spPr>
+        <p:txBody>
+          <a:bodyPr wrap="none" rtlCol="0">
+            <a:spAutoFit/>
+          </a:bodyPr>
+          <a:lstStyle/>
+          <a:p>
+            <a:r>
+              <a:rPr lang="en-US" sz="4400" dirty="0">
+                <a:solidFill>
+                  <a:srgbClr val="FA4A5C"/>
+                </a:solidFill>
+              </a:rPr>
+              <a:t>Welcome to Bev’s Bakery</a:t>
+            </a:r>
+            <a:r>
+              <a:rPr lang="en-US" sz="4000" dirty="0">
+                <a:solidFill>
+                  <a:srgbClr val="FA4A5C"/>
+                </a:solidFill>
+                <a:latin typeface="Daytona" panose="020B0604030500040204" pitchFamily="34" charset="0"/>
+              </a:rPr>
+              <a:t>!</a:t>
+            </a:r>
+          </a:p>
+        </p:txBody>
+      </p:sp>
+    </p:spTree>
+    <p:extLst>
+      <p:ext uri="{BB962C8B-B14F-4D97-AF65-F5344CB8AC3E}">
+        <p14:creationId xmlns:p14="http://schemas.microsoft.com/office/powerpoint/2010/main" val="4196731743"/>
+      </p:ext>
+    </p:extLst>
+  </p:cSld>
+  <p:clrMapOvr>
+    <a:masterClrMapping/>
+  </p:clrMapOvr>
+</p:sld>
+</file>
+
+<file path=ppt/slides/slide5.xml><?xml version="1.0" encoding="utf-8"?>
+<p:sld xmlns:a="http://schemas.openxmlformats.org/drawingml/2006/main" xmlns:r="http://schemas.openxmlformats.org/officeDocument/2006/relationships" xmlns:p="http://schemas.openxmlformats.org/presentationml/2006/main">
+  <p:cSld>
+    <p:spTree>
+      <p:nvGrpSpPr>
+        <p:cNvPr id="1" name=""/>
+        <p:cNvGrpSpPr/>
+        <p:nvPr/>
+      </p:nvGrpSpPr>
+      <p:grpSpPr>
+        <a:xfrm>
+          <a:off x="0" y="0"/>
+          <a:ext cx="0" cy="0"/>
+          <a:chOff x="0" y="0"/>
+          <a:chExt cx="0" cy="0"/>
+        </a:xfrm>
+      </p:grpSpPr>
+      <p:grpSp>
+        <p:nvGrpSpPr>
+          <p:cNvPr id="2" name="Browser" descr="&lt;SmartSettings&gt;&lt;SmartResize enabled=&quot;True&quot; minWidth=&quot;140&quot; minHeight=&quot;50&quot; /&gt;&lt;/SmartSettings&gt;">
+            <a:extLst>
+              <a:ext uri="{FF2B5EF4-FFF2-40B4-BE49-F238E27FC236}">
+                <a16:creationId xmlns:a16="http://schemas.microsoft.com/office/drawing/2014/main" id="{F55A0B3E-3C6C-45F3-9080-4E94F46D1496}"/>
+              </a:ext>
+            </a:extLst>
+          </p:cNvPr>
+          <p:cNvGrpSpPr/>
+          <p:nvPr>
+            <p:custDataLst>
+              <p:tags r:id="rId1"/>
+            </p:custDataLst>
+          </p:nvPr>
+        </p:nvGrpSpPr>
+        <p:grpSpPr>
+          <a:xfrm>
+            <a:off x="41789" y="0"/>
+            <a:ext cx="12150211" cy="6674530"/>
+            <a:chOff x="595684" y="1261242"/>
+            <a:chExt cx="6668462" cy="4352544"/>
+          </a:xfrm>
+        </p:grpSpPr>
+        <p:sp>
+          <p:nvSpPr>
+            <p:cNvPr id="3" name="Window Body" descr="&lt;SmartSettings&gt;&lt;SmartResize anchorLeft=&quot;Absolute&quot; anchorTop=&quot;Absolute&quot; anchorRight=&quot;Absolute&quot; anchorBottom=&quot;Absolute&quot; /&gt;&lt;/SmartSettings&gt;">
+              <a:extLst>
+                <a:ext uri="{FF2B5EF4-FFF2-40B4-BE49-F238E27FC236}">
+                  <a16:creationId xmlns:a16="http://schemas.microsoft.com/office/drawing/2014/main" id="{EA6DFF82-A40C-486A-8C0E-84226F8F845F}"/>
+                </a:ext>
+              </a:extLst>
+            </p:cNvPr>
+            <p:cNvSpPr/>
+            <p:nvPr>
+              <p:custDataLst>
+                <p:tags r:id="rId2"/>
+              </p:custDataLst>
+            </p:nvPr>
+          </p:nvSpPr>
+          <p:spPr>
+            <a:xfrm>
+              <a:off x="595684" y="1610112"/>
+              <a:ext cx="6668462" cy="4003674"/>
+            </a:xfrm>
+            <a:prstGeom prst="rect">
+              <a:avLst/>
+            </a:prstGeom>
+            <a:solidFill>
+              <a:srgbClr val="FFFFFF"/>
+            </a:solidFill>
+            <a:ln w="6350">
+              <a:solidFill>
+                <a:srgbClr val="808080"/>
+              </a:solidFill>
+            </a:ln>
+          </p:spPr>
+          <p:style>
+            <a:lnRef idx="2">
+              <a:schemeClr val="accent1">
+                <a:shade val="50000"/>
+              </a:schemeClr>
+            </a:lnRef>
+            <a:fillRef idx="1">
+              <a:schemeClr val="accent1"/>
+            </a:fillRef>
+            <a:effectRef idx="0">
+              <a:schemeClr val="accent1"/>
+            </a:effectRef>
+            <a:fontRef idx="minor">
+              <a:schemeClr val="lt1"/>
+            </a:fontRef>
+          </p:style>
+          <p:txBody>
+            <a:bodyPr rot="0" spcFirstLastPara="0" vert="horz" wrap="square" lIns="91440" tIns="45720" rIns="91440" bIns="45720" numCol="1" spcCol="0" rtlCol="0" fromWordArt="0" anchor="ctr" anchorCtr="0" forceAA="0" compatLnSpc="1">
+              <a:prstTxWarp prst="textNoShape">
+                <a:avLst/>
+              </a:prstTxWarp>
+              <a:noAutofit/>
+            </a:bodyPr>
+            <a:lstStyle>
+              <a:defPPr>
+                <a:defRPr lang="en-US"/>
+              </a:defPPr>
+              <a:lvl1pPr marL="0" algn="l" defTabSz="914400" rtl="0" eaLnBrk="1" latinLnBrk="0" hangingPunct="1">
+                <a:defRPr sz="1800" kern="1200">
+                  <a:solidFill>
+                    <a:schemeClr val="lt1"/>
+                  </a:solidFill>
+                  <a:latin typeface="+mn-lt"/>
+                  <a:ea typeface="+mn-ea"/>
+                  <a:cs typeface="+mn-cs"/>
+                </a:defRPr>
+              </a:lvl1pPr>
+              <a:lvl2pPr marL="457200" algn="l" defTabSz="914400" rtl="0" eaLnBrk="1" latinLnBrk="0" hangingPunct="1">
+                <a:defRPr sz="1800" kern="1200">
+                  <a:solidFill>
+                    <a:schemeClr val="lt1"/>
+                  </a:solidFill>
+                  <a:latin typeface="+mn-lt"/>
+                  <a:ea typeface="+mn-ea"/>
+                  <a:cs typeface="+mn-cs"/>
+                </a:defRPr>
+              </a:lvl2pPr>
+              <a:lvl3pPr marL="914400" algn="l" defTabSz="914400" rtl="0" eaLnBrk="1" latinLnBrk="0" hangingPunct="1">
+                <a:defRPr sz="1800" kern="1200">
+                  <a:solidFill>
+                    <a:schemeClr val="lt1"/>
+                  </a:solidFill>
+                  <a:latin typeface="+mn-lt"/>
+                  <a:ea typeface="+mn-ea"/>
+                  <a:cs typeface="+mn-cs"/>
+                </a:defRPr>
+              </a:lvl3pPr>
+              <a:lvl4pPr marL="1371600" algn="l" defTabSz="914400" rtl="0" eaLnBrk="1" latinLnBrk="0" hangingPunct="1">
+                <a:defRPr sz="1800" kern="1200">
+                  <a:solidFill>
+                    <a:schemeClr val="lt1"/>
+                  </a:solidFill>
+                  <a:latin typeface="+mn-lt"/>
+                  <a:ea typeface="+mn-ea"/>
+                  <a:cs typeface="+mn-cs"/>
+                </a:defRPr>
+              </a:lvl4pPr>
+              <a:lvl5pPr marL="1828800" algn="l" defTabSz="914400" rtl="0" eaLnBrk="1" latinLnBrk="0" hangingPunct="1">
+                <a:defRPr sz="1800" kern="1200">
+                  <a:solidFill>
+                    <a:schemeClr val="lt1"/>
+                  </a:solidFill>
+                  <a:latin typeface="+mn-lt"/>
+                  <a:ea typeface="+mn-ea"/>
+                  <a:cs typeface="+mn-cs"/>
+                </a:defRPr>
+              </a:lvl5pPr>
+              <a:lvl6pPr marL="2286000" algn="l" defTabSz="914400" rtl="0" eaLnBrk="1" latinLnBrk="0" hangingPunct="1">
+                <a:defRPr sz="1800" kern="1200">
+                  <a:solidFill>
+                    <a:schemeClr val="lt1"/>
+                  </a:solidFill>
+                  <a:latin typeface="+mn-lt"/>
+                  <a:ea typeface="+mn-ea"/>
+                  <a:cs typeface="+mn-cs"/>
+                </a:defRPr>
+              </a:lvl6pPr>
+              <a:lvl7pPr marL="2743200" algn="l" defTabSz="914400" rtl="0" eaLnBrk="1" latinLnBrk="0" hangingPunct="1">
+                <a:defRPr sz="1800" kern="1200">
+                  <a:solidFill>
+                    <a:schemeClr val="lt1"/>
+                  </a:solidFill>
+                  <a:latin typeface="+mn-lt"/>
+                  <a:ea typeface="+mn-ea"/>
+                  <a:cs typeface="+mn-cs"/>
+                </a:defRPr>
+              </a:lvl7pPr>
+              <a:lvl8pPr marL="3200400" algn="l" defTabSz="914400" rtl="0" eaLnBrk="1" latinLnBrk="0" hangingPunct="1">
+                <a:defRPr sz="1800" kern="1200">
+                  <a:solidFill>
+                    <a:schemeClr val="lt1"/>
+                  </a:solidFill>
+                  <a:latin typeface="+mn-lt"/>
+                  <a:ea typeface="+mn-ea"/>
+                  <a:cs typeface="+mn-cs"/>
+                </a:defRPr>
+              </a:lvl8pPr>
+              <a:lvl9pPr marL="3657600" algn="l" defTabSz="914400" rtl="0" eaLnBrk="1" latinLnBrk="0" hangingPunct="1">
+                <a:defRPr sz="1800" kern="1200">
+                  <a:solidFill>
+                    <a:schemeClr val="lt1"/>
+                  </a:solidFill>
+                  <a:latin typeface="+mn-lt"/>
+                  <a:ea typeface="+mn-ea"/>
+                  <a:cs typeface="+mn-cs"/>
+                </a:defRPr>
+              </a:lvl9pPr>
+            </a:lstStyle>
+            <a:p>
+              <a:pPr algn="ctr"/>
+              <a:endParaRPr lang="en-US" dirty="0">
+                <a:solidFill>
+                  <a:srgbClr val="5F5F5F"/>
+                </a:solidFill>
+                <a:latin typeface="Daytona" panose="020B0604030500040204" pitchFamily="34" charset="0"/>
+                <a:cs typeface="Segoe UI" panose="020B0502040204020203" pitchFamily="34" charset="0"/>
+              </a:endParaRPr>
+            </a:p>
+          </p:txBody>
+        </p:sp>
+        <p:sp>
+          <p:nvSpPr>
+            <p:cNvPr id="4" name="Title Bar" descr="&lt;SmartSettings&gt;&lt;SmartResize anchorLeft=&quot;Absolute&quot; anchorTop=&quot;Absolute&quot; anchorRight=&quot;Absolute&quot; anchorBottom=&quot;None&quot; /&gt;&lt;/SmartSettings&gt;">
+              <a:extLst>
+                <a:ext uri="{FF2B5EF4-FFF2-40B4-BE49-F238E27FC236}">
+                  <a16:creationId xmlns:a16="http://schemas.microsoft.com/office/drawing/2014/main" id="{72189BF0-AC5E-4D65-A2CF-574BA6AA2455}"/>
+                </a:ext>
+              </a:extLst>
+            </p:cNvPr>
+            <p:cNvSpPr/>
+            <p:nvPr>
+              <p:custDataLst>
+                <p:tags r:id="rId3"/>
+              </p:custDataLst>
+            </p:nvPr>
+          </p:nvSpPr>
+          <p:spPr>
+            <a:xfrm>
+              <a:off x="595685" y="1261242"/>
+              <a:ext cx="6668461" cy="350235"/>
+            </a:xfrm>
+            <a:prstGeom prst="rect">
+              <a:avLst/>
+            </a:prstGeom>
+            <a:solidFill>
+              <a:srgbClr val="FFFFFF"/>
+            </a:solidFill>
+            <a:ln w="6350">
+              <a:solidFill>
+                <a:srgbClr val="808080"/>
+              </a:solidFill>
+            </a:ln>
+          </p:spPr>
+          <p:style>
+            <a:lnRef idx="2">
+              <a:schemeClr val="accent1">
+                <a:shade val="50000"/>
+              </a:schemeClr>
+            </a:lnRef>
+            <a:fillRef idx="1">
+              <a:schemeClr val="accent1"/>
+            </a:fillRef>
+            <a:effectRef idx="0">
+              <a:schemeClr val="accent1"/>
+            </a:effectRef>
+            <a:fontRef idx="minor">
+              <a:schemeClr val="lt1"/>
+            </a:fontRef>
+          </p:style>
+          <p:txBody>
+            <a:bodyPr rot="0" spcFirstLastPara="0" vert="horz" wrap="square" lIns="91440" tIns="45720" rIns="228600" bIns="45720" numCol="1" spcCol="0" rtlCol="0" fromWordArt="0" anchor="t" anchorCtr="0" forceAA="0" compatLnSpc="1">
+              <a:prstTxWarp prst="textNoShape">
+                <a:avLst/>
+              </a:prstTxWarp>
+              <a:noAutofit/>
+            </a:bodyPr>
+            <a:lstStyle>
+              <a:defPPr>
+                <a:defRPr lang="en-US"/>
+              </a:defPPr>
+              <a:lvl1pPr marL="0" algn="l" defTabSz="914400" rtl="0" eaLnBrk="1" latinLnBrk="0" hangingPunct="1">
+                <a:defRPr sz="1800" kern="1200">
+                  <a:solidFill>
+                    <a:schemeClr val="lt1"/>
+                  </a:solidFill>
+                  <a:latin typeface="+mn-lt"/>
+                  <a:ea typeface="+mn-ea"/>
+                  <a:cs typeface="+mn-cs"/>
+                </a:defRPr>
+              </a:lvl1pPr>
+              <a:lvl2pPr marL="457200" algn="l" defTabSz="914400" rtl="0" eaLnBrk="1" latinLnBrk="0" hangingPunct="1">
+                <a:defRPr sz="1800" kern="1200">
+                  <a:solidFill>
+                    <a:schemeClr val="lt1"/>
+                  </a:solidFill>
+                  <a:latin typeface="+mn-lt"/>
+                  <a:ea typeface="+mn-ea"/>
+                  <a:cs typeface="+mn-cs"/>
+                </a:defRPr>
+              </a:lvl2pPr>
+              <a:lvl3pPr marL="914400" algn="l" defTabSz="914400" rtl="0" eaLnBrk="1" latinLnBrk="0" hangingPunct="1">
+                <a:defRPr sz="1800" kern="1200">
+                  <a:solidFill>
+                    <a:schemeClr val="lt1"/>
+                  </a:solidFill>
+                  <a:latin typeface="+mn-lt"/>
+                  <a:ea typeface="+mn-ea"/>
+                  <a:cs typeface="+mn-cs"/>
+                </a:defRPr>
+              </a:lvl3pPr>
+              <a:lvl4pPr marL="1371600" algn="l" defTabSz="914400" rtl="0" eaLnBrk="1" latinLnBrk="0" hangingPunct="1">
+                <a:defRPr sz="1800" kern="1200">
+                  <a:solidFill>
+                    <a:schemeClr val="lt1"/>
+                  </a:solidFill>
+                  <a:latin typeface="+mn-lt"/>
+                  <a:ea typeface="+mn-ea"/>
+                  <a:cs typeface="+mn-cs"/>
+                </a:defRPr>
+              </a:lvl4pPr>
+              <a:lvl5pPr marL="1828800" algn="l" defTabSz="914400" rtl="0" eaLnBrk="1" latinLnBrk="0" hangingPunct="1">
+                <a:defRPr sz="1800" kern="1200">
+                  <a:solidFill>
+                    <a:schemeClr val="lt1"/>
+                  </a:solidFill>
+                  <a:latin typeface="+mn-lt"/>
+                  <a:ea typeface="+mn-ea"/>
+                  <a:cs typeface="+mn-cs"/>
+                </a:defRPr>
+              </a:lvl5pPr>
+              <a:lvl6pPr marL="2286000" algn="l" defTabSz="914400" rtl="0" eaLnBrk="1" latinLnBrk="0" hangingPunct="1">
+                <a:defRPr sz="1800" kern="1200">
+                  <a:solidFill>
+                    <a:schemeClr val="lt1"/>
+                  </a:solidFill>
+                  <a:latin typeface="+mn-lt"/>
+                  <a:ea typeface="+mn-ea"/>
+                  <a:cs typeface="+mn-cs"/>
+                </a:defRPr>
+              </a:lvl6pPr>
+              <a:lvl7pPr marL="2743200" algn="l" defTabSz="914400" rtl="0" eaLnBrk="1" latinLnBrk="0" hangingPunct="1">
+                <a:defRPr sz="1800" kern="1200">
+                  <a:solidFill>
+                    <a:schemeClr val="lt1"/>
+                  </a:solidFill>
+                  <a:latin typeface="+mn-lt"/>
+                  <a:ea typeface="+mn-ea"/>
+                  <a:cs typeface="+mn-cs"/>
+                </a:defRPr>
+              </a:lvl7pPr>
+              <a:lvl8pPr marL="3200400" algn="l" defTabSz="914400" rtl="0" eaLnBrk="1" latinLnBrk="0" hangingPunct="1">
+                <a:defRPr sz="1800" kern="1200">
+                  <a:solidFill>
+                    <a:schemeClr val="lt1"/>
+                  </a:solidFill>
+                  <a:latin typeface="+mn-lt"/>
+                  <a:ea typeface="+mn-ea"/>
+                  <a:cs typeface="+mn-cs"/>
+                </a:defRPr>
+              </a:lvl8pPr>
+              <a:lvl9pPr marL="3657600" algn="l" defTabSz="914400" rtl="0" eaLnBrk="1" latinLnBrk="0" hangingPunct="1">
+                <a:defRPr sz="1800" kern="1200">
+                  <a:solidFill>
+                    <a:schemeClr val="lt1"/>
+                  </a:solidFill>
+                  <a:latin typeface="+mn-lt"/>
+                  <a:ea typeface="+mn-ea"/>
+                  <a:cs typeface="+mn-cs"/>
+                </a:defRPr>
+              </a:lvl9pPr>
+            </a:lstStyle>
+            <a:p>
+              <a:r>
+                <a:rPr lang="en-US" sz="900" dirty="0">
+                  <a:solidFill>
+                    <a:srgbClr val="5F5F5F"/>
+                  </a:solidFill>
+                  <a:latin typeface="Segoe UI" panose="020B0502040204020203" pitchFamily="34" charset="0"/>
+                  <a:cs typeface="Segoe UI" panose="020B0502040204020203" pitchFamily="34" charset="0"/>
+                </a:rPr>
+                <a:t>Browser</a:t>
+              </a:r>
+            </a:p>
+          </p:txBody>
+        </p:sp>
+        <p:sp>
+          <p:nvSpPr>
+            <p:cNvPr id="5" name="Menu Button" descr="&lt;SmartSettings&gt;&lt;SmartResize anchorLeft=&quot;None&quot; anchorTop=&quot;Absolute&quot; anchorRight=&quot;Absolute&quot; anchorBottom=&quot;None&quot; /&gt;&lt;/SmartSettings&gt;">
+              <a:extLst>
+                <a:ext uri="{FF2B5EF4-FFF2-40B4-BE49-F238E27FC236}">
+                  <a16:creationId xmlns:a16="http://schemas.microsoft.com/office/drawing/2014/main" id="{FBD31311-E410-4BA8-9473-74A3344A4208}"/>
+                </a:ext>
+              </a:extLst>
+            </p:cNvPr>
+            <p:cNvSpPr>
+              <a:spLocks noChangeAspect="1" noEditPoints="1"/>
+            </p:cNvSpPr>
+            <p:nvPr>
+              <p:custDataLst>
+                <p:tags r:id="rId4"/>
+              </p:custDataLst>
+            </p:nvPr>
+          </p:nvSpPr>
+          <p:spPr bwMode="auto">
+            <a:xfrm>
+              <a:off x="7133588" y="1461806"/>
+              <a:ext cx="81900" cy="73502"/>
+            </a:xfrm>
+            <a:custGeom>
+              <a:avLst/>
+              <a:gdLst>
+                <a:gd name="T0" fmla="*/ 0 w 415"/>
+                <a:gd name="T1" fmla="*/ 309 h 309"/>
+                <a:gd name="T2" fmla="*/ 415 w 415"/>
+                <a:gd name="T3" fmla="*/ 309 h 309"/>
+                <a:gd name="T4" fmla="*/ 0 w 415"/>
+                <a:gd name="T5" fmla="*/ 155 h 309"/>
+                <a:gd name="T6" fmla="*/ 415 w 415"/>
+                <a:gd name="T7" fmla="*/ 155 h 309"/>
+                <a:gd name="T8" fmla="*/ 0 w 415"/>
+                <a:gd name="T9" fmla="*/ 0 h 309"/>
+                <a:gd name="T10" fmla="*/ 415 w 415"/>
+                <a:gd name="T11" fmla="*/ 0 h 309"/>
+              </a:gdLst>
+              <a:ahLst/>
+              <a:cxnLst>
+                <a:cxn ang="0">
+                  <a:pos x="T0" y="T1"/>
+                </a:cxn>
+                <a:cxn ang="0">
+                  <a:pos x="T2" y="T3"/>
+                </a:cxn>
+                <a:cxn ang="0">
+                  <a:pos x="T4" y="T5"/>
+                </a:cxn>
+                <a:cxn ang="0">
+                  <a:pos x="T6" y="T7"/>
+                </a:cxn>
+                <a:cxn ang="0">
+                  <a:pos x="T8" y="T9"/>
+                </a:cxn>
+                <a:cxn ang="0">
+                  <a:pos x="T10" y="T11"/>
+                </a:cxn>
+              </a:cxnLst>
+              <a:rect l="0" t="0" r="r" b="b"/>
+              <a:pathLst>
+                <a:path w="415" h="309">
+                  <a:moveTo>
+                    <a:pt x="0" y="309"/>
+                  </a:moveTo>
+                  <a:lnTo>
+                    <a:pt x="415" y="309"/>
+                  </a:lnTo>
+                  <a:moveTo>
+                    <a:pt x="0" y="155"/>
+                  </a:moveTo>
+                  <a:lnTo>
+                    <a:pt x="415" y="155"/>
+                  </a:lnTo>
+                  <a:moveTo>
+                    <a:pt x="0" y="0"/>
+                  </a:moveTo>
+                  <a:lnTo>
+                    <a:pt x="415" y="0"/>
+                  </a:lnTo>
+                </a:path>
+              </a:pathLst>
+            </a:custGeom>
+            <a:noFill/>
+            <a:ln w="6350" cap="flat">
+              <a:solidFill>
+                <a:srgbClr val="808080"/>
+              </a:solidFill>
+              <a:prstDash val="solid"/>
+              <a:miter lim="800000"/>
+              <a:headEnd/>
+              <a:tailEnd/>
+            </a:ln>
+            <a:extLst>
+              <a:ext uri="{909E8E84-426E-40DD-AFC4-6F175D3DCCD1}">
+                <a14:hiddenFill xmlns:a14="http://schemas.microsoft.com/office/drawing/2010/main">
+                  <a:solidFill>
+                    <a:srgbClr val="FFFFFF"/>
+                  </a:solidFill>
+                </a14:hiddenFill>
+              </a:ext>
+            </a:extLst>
+          </p:spPr>
+          <p:txBody>
+            <a:bodyPr vert="horz" wrap="square" lIns="91440" tIns="45720" rIns="91440" bIns="45720" numCol="1" anchor="t" anchorCtr="0" compatLnSpc="1">
+              <a:prstTxWarp prst="textNoShape">
+                <a:avLst/>
+              </a:prstTxWarp>
+            </a:bodyPr>
+            <a:lstStyle>
+              <a:defPPr>
+                <a:defRPr lang="en-US"/>
+              </a:defPPr>
+              <a:lvl1pPr marL="0" algn="l" defTabSz="914400" rtl="0" eaLnBrk="1" latinLnBrk="0" hangingPunct="1">
+                <a:defRPr sz="1800" kern="1200">
+                  <a:solidFill>
+                    <a:schemeClr val="tx1"/>
+                  </a:solidFill>
+                  <a:latin typeface="+mn-lt"/>
+                  <a:ea typeface="+mn-ea"/>
+                  <a:cs typeface="+mn-cs"/>
+                </a:defRPr>
+              </a:lvl1pPr>
+              <a:lvl2pPr marL="457200" algn="l" defTabSz="914400" rtl="0" eaLnBrk="1" latinLnBrk="0" hangingPunct="1">
+                <a:defRPr sz="1800" kern="1200">
+                  <a:solidFill>
+                    <a:schemeClr val="tx1"/>
+                  </a:solidFill>
+                  <a:latin typeface="+mn-lt"/>
+                  <a:ea typeface="+mn-ea"/>
+                  <a:cs typeface="+mn-cs"/>
+                </a:defRPr>
+              </a:lvl2pPr>
+              <a:lvl3pPr marL="914400" algn="l" defTabSz="914400" rtl="0" eaLnBrk="1" latinLnBrk="0" hangingPunct="1">
+                <a:defRPr sz="1800" kern="1200">
+                  <a:solidFill>
+                    <a:schemeClr val="tx1"/>
+                  </a:solidFill>
+                  <a:latin typeface="+mn-lt"/>
+                  <a:ea typeface="+mn-ea"/>
+                  <a:cs typeface="+mn-cs"/>
+                </a:defRPr>
+              </a:lvl3pPr>
+              <a:lvl4pPr marL="1371600" algn="l" defTabSz="914400" rtl="0" eaLnBrk="1" latinLnBrk="0" hangingPunct="1">
+                <a:defRPr sz="1800" kern="1200">
+                  <a:solidFill>
+                    <a:schemeClr val="tx1"/>
+                  </a:solidFill>
+                  <a:latin typeface="+mn-lt"/>
+                  <a:ea typeface="+mn-ea"/>
+                  <a:cs typeface="+mn-cs"/>
+                </a:defRPr>
+              </a:lvl4pPr>
+              <a:lvl5pPr marL="1828800" algn="l" defTabSz="914400" rtl="0" eaLnBrk="1" latinLnBrk="0" hangingPunct="1">
+                <a:defRPr sz="1800" kern="1200">
+                  <a:solidFill>
+                    <a:schemeClr val="tx1"/>
+                  </a:solidFill>
+                  <a:latin typeface="+mn-lt"/>
+                  <a:ea typeface="+mn-ea"/>
+                  <a:cs typeface="+mn-cs"/>
+                </a:defRPr>
+              </a:lvl5pPr>
+              <a:lvl6pPr marL="2286000" algn="l" defTabSz="914400" rtl="0" eaLnBrk="1" latinLnBrk="0" hangingPunct="1">
+                <a:defRPr sz="1800" kern="1200">
+                  <a:solidFill>
+                    <a:schemeClr val="tx1"/>
+                  </a:solidFill>
+                  <a:latin typeface="+mn-lt"/>
+                  <a:ea typeface="+mn-ea"/>
+                  <a:cs typeface="+mn-cs"/>
+                </a:defRPr>
+              </a:lvl6pPr>
+              <a:lvl7pPr marL="2743200" algn="l" defTabSz="914400" rtl="0" eaLnBrk="1" latinLnBrk="0" hangingPunct="1">
+                <a:defRPr sz="1800" kern="1200">
+                  <a:solidFill>
+                    <a:schemeClr val="tx1"/>
+                  </a:solidFill>
+                  <a:latin typeface="+mn-lt"/>
+                  <a:ea typeface="+mn-ea"/>
+                  <a:cs typeface="+mn-cs"/>
+                </a:defRPr>
+              </a:lvl7pPr>
+              <a:lvl8pPr marL="3200400" algn="l" defTabSz="914400" rtl="0" eaLnBrk="1" latinLnBrk="0" hangingPunct="1">
+                <a:defRPr sz="1800" kern="1200">
+                  <a:solidFill>
+                    <a:schemeClr val="tx1"/>
+                  </a:solidFill>
+                  <a:latin typeface="+mn-lt"/>
+                  <a:ea typeface="+mn-ea"/>
+                  <a:cs typeface="+mn-cs"/>
+                </a:defRPr>
+              </a:lvl8pPr>
+              <a:lvl9pPr marL="3657600" algn="l" defTabSz="914400" rtl="0" eaLnBrk="1" latinLnBrk="0" hangingPunct="1">
+                <a:defRPr sz="1800" kern="1200">
+                  <a:solidFill>
+                    <a:schemeClr val="tx1"/>
+                  </a:solidFill>
+                  <a:latin typeface="+mn-lt"/>
+                  <a:ea typeface="+mn-ea"/>
+                  <a:cs typeface="+mn-cs"/>
+                </a:defRPr>
+              </a:lvl9pPr>
+            </a:lstStyle>
+            <a:p>
+              <a:endParaRPr lang="en-US">
+                <a:solidFill>
+                  <a:srgbClr val="5F5F5F"/>
+                </a:solidFill>
+                <a:latin typeface="Segoe UI" panose="020B0502040204020203" pitchFamily="34" charset="0"/>
+                <a:cs typeface="Segoe UI" panose="020B0502040204020203" pitchFamily="34" charset="0"/>
+              </a:endParaRPr>
+            </a:p>
+          </p:txBody>
+        </p:sp>
+        <p:sp>
+          <p:nvSpPr>
+            <p:cNvPr id="6" name="Close Button" descr="&lt;SmartSettings&gt;&lt;SmartResize anchorLeft=&quot;None&quot; anchorTop=&quot;Absolute&quot; anchorRight=&quot;Absolute&quot; anchorBottom=&quot;None&quot; /&gt;&lt;/SmartSettings&gt;">
+              <a:extLst>
+                <a:ext uri="{FF2B5EF4-FFF2-40B4-BE49-F238E27FC236}">
+                  <a16:creationId xmlns:a16="http://schemas.microsoft.com/office/drawing/2014/main" id="{86519DE8-2FD2-4AF2-8DA5-2DD8B26F0F3B}"/>
+                </a:ext>
+              </a:extLst>
+            </p:cNvPr>
+            <p:cNvSpPr>
+              <a:spLocks noEditPoints="1"/>
+            </p:cNvSpPr>
+            <p:nvPr>
+              <p:custDataLst>
+                <p:tags r:id="rId5"/>
+              </p:custDataLst>
+            </p:nvPr>
+          </p:nvSpPr>
+          <p:spPr bwMode="auto">
+            <a:xfrm>
+              <a:off x="7148405" y="1307703"/>
+              <a:ext cx="54019" cy="62114"/>
+            </a:xfrm>
+            <a:custGeom>
+              <a:avLst/>
+              <a:gdLst>
+                <a:gd name="T0" fmla="*/ 254 w 254"/>
+                <a:gd name="T1" fmla="*/ 0 h 254"/>
+                <a:gd name="T2" fmla="*/ 0 w 254"/>
+                <a:gd name="T3" fmla="*/ 254 h 254"/>
+                <a:gd name="T4" fmla="*/ 0 w 254"/>
+                <a:gd name="T5" fmla="*/ 0 h 254"/>
+                <a:gd name="T6" fmla="*/ 254 w 254"/>
+                <a:gd name="T7" fmla="*/ 254 h 254"/>
+              </a:gdLst>
+              <a:ahLst/>
+              <a:cxnLst>
+                <a:cxn ang="0">
+                  <a:pos x="T0" y="T1"/>
+                </a:cxn>
+                <a:cxn ang="0">
+                  <a:pos x="T2" y="T3"/>
+                </a:cxn>
+                <a:cxn ang="0">
+                  <a:pos x="T4" y="T5"/>
+                </a:cxn>
+                <a:cxn ang="0">
+                  <a:pos x="T6" y="T7"/>
+                </a:cxn>
+              </a:cxnLst>
+              <a:rect l="0" t="0" r="r" b="b"/>
+              <a:pathLst>
+                <a:path w="254" h="254">
+                  <a:moveTo>
+                    <a:pt x="254" y="0"/>
+                  </a:moveTo>
+                  <a:lnTo>
+                    <a:pt x="0" y="254"/>
+                  </a:lnTo>
+                  <a:moveTo>
+                    <a:pt x="0" y="0"/>
+                  </a:moveTo>
+                  <a:lnTo>
+                    <a:pt x="254" y="254"/>
+                  </a:lnTo>
+                </a:path>
+              </a:pathLst>
+            </a:custGeom>
+            <a:noFill/>
+            <a:ln w="9525" cap="flat">
+              <a:solidFill>
+                <a:srgbClr val="808080"/>
+              </a:solidFill>
+              <a:prstDash val="solid"/>
+              <a:miter lim="800000"/>
+              <a:headEnd/>
+              <a:tailEnd/>
+            </a:ln>
+            <a:extLst>
+              <a:ext uri="{909E8E84-426E-40DD-AFC4-6F175D3DCCD1}">
+                <a14:hiddenFill xmlns:a14="http://schemas.microsoft.com/office/drawing/2010/main">
+                  <a:solidFill>
+                    <a:srgbClr val="FFFFFF"/>
+                  </a:solidFill>
+                </a14:hiddenFill>
+              </a:ext>
+            </a:extLst>
+          </p:spPr>
+          <p:txBody>
+            <a:bodyPr vert="horz" wrap="square" lIns="91440" tIns="45720" rIns="91440" bIns="45720" numCol="1" anchor="t" anchorCtr="0" compatLnSpc="1">
+              <a:prstTxWarp prst="textNoShape">
+                <a:avLst/>
+              </a:prstTxWarp>
+            </a:bodyPr>
+            <a:lstStyle>
+              <a:defPPr>
+                <a:defRPr lang="en-US"/>
+              </a:defPPr>
+              <a:lvl1pPr marL="0" algn="l" defTabSz="914400" rtl="0" eaLnBrk="1" latinLnBrk="0" hangingPunct="1">
+                <a:defRPr sz="1800" kern="1200">
+                  <a:solidFill>
+                    <a:schemeClr val="tx1"/>
+                  </a:solidFill>
+                  <a:latin typeface="+mn-lt"/>
+                  <a:ea typeface="+mn-ea"/>
+                  <a:cs typeface="+mn-cs"/>
+                </a:defRPr>
+              </a:lvl1pPr>
+              <a:lvl2pPr marL="457200" algn="l" defTabSz="914400" rtl="0" eaLnBrk="1" latinLnBrk="0" hangingPunct="1">
+                <a:defRPr sz="1800" kern="1200">
+                  <a:solidFill>
+                    <a:schemeClr val="tx1"/>
+                  </a:solidFill>
+                  <a:latin typeface="+mn-lt"/>
+                  <a:ea typeface="+mn-ea"/>
+                  <a:cs typeface="+mn-cs"/>
+                </a:defRPr>
+              </a:lvl2pPr>
+              <a:lvl3pPr marL="914400" algn="l" defTabSz="914400" rtl="0" eaLnBrk="1" latinLnBrk="0" hangingPunct="1">
+                <a:defRPr sz="1800" kern="1200">
+                  <a:solidFill>
+                    <a:schemeClr val="tx1"/>
+                  </a:solidFill>
+                  <a:latin typeface="+mn-lt"/>
+                  <a:ea typeface="+mn-ea"/>
+                  <a:cs typeface="+mn-cs"/>
+                </a:defRPr>
+              </a:lvl3pPr>
+              <a:lvl4pPr marL="1371600" algn="l" defTabSz="914400" rtl="0" eaLnBrk="1" latinLnBrk="0" hangingPunct="1">
+                <a:defRPr sz="1800" kern="1200">
+                  <a:solidFill>
+                    <a:schemeClr val="tx1"/>
+                  </a:solidFill>
+                  <a:latin typeface="+mn-lt"/>
+                  <a:ea typeface="+mn-ea"/>
+                  <a:cs typeface="+mn-cs"/>
+                </a:defRPr>
+              </a:lvl4pPr>
+              <a:lvl5pPr marL="1828800" algn="l" defTabSz="914400" rtl="0" eaLnBrk="1" latinLnBrk="0" hangingPunct="1">
+                <a:defRPr sz="1800" kern="1200">
+                  <a:solidFill>
+                    <a:schemeClr val="tx1"/>
+                  </a:solidFill>
+                  <a:latin typeface="+mn-lt"/>
+                  <a:ea typeface="+mn-ea"/>
+                  <a:cs typeface="+mn-cs"/>
+                </a:defRPr>
+              </a:lvl5pPr>
+              <a:lvl6pPr marL="2286000" algn="l" defTabSz="914400" rtl="0" eaLnBrk="1" latinLnBrk="0" hangingPunct="1">
+                <a:defRPr sz="1800" kern="1200">
+                  <a:solidFill>
+                    <a:schemeClr val="tx1"/>
+                  </a:solidFill>
+                  <a:latin typeface="+mn-lt"/>
+                  <a:ea typeface="+mn-ea"/>
+                  <a:cs typeface="+mn-cs"/>
+                </a:defRPr>
+              </a:lvl6pPr>
+              <a:lvl7pPr marL="2743200" algn="l" defTabSz="914400" rtl="0" eaLnBrk="1" latinLnBrk="0" hangingPunct="1">
+                <a:defRPr sz="1800" kern="1200">
+                  <a:solidFill>
+                    <a:schemeClr val="tx1"/>
+                  </a:solidFill>
+                  <a:latin typeface="+mn-lt"/>
+                  <a:ea typeface="+mn-ea"/>
+                  <a:cs typeface="+mn-cs"/>
+                </a:defRPr>
+              </a:lvl7pPr>
+              <a:lvl8pPr marL="3200400" algn="l" defTabSz="914400" rtl="0" eaLnBrk="1" latinLnBrk="0" hangingPunct="1">
+                <a:defRPr sz="1800" kern="1200">
+                  <a:solidFill>
+                    <a:schemeClr val="tx1"/>
+                  </a:solidFill>
+                  <a:latin typeface="+mn-lt"/>
+                  <a:ea typeface="+mn-ea"/>
+                  <a:cs typeface="+mn-cs"/>
+                </a:defRPr>
+              </a:lvl8pPr>
+              <a:lvl9pPr marL="3657600" algn="l" defTabSz="914400" rtl="0" eaLnBrk="1" latinLnBrk="0" hangingPunct="1">
+                <a:defRPr sz="1800" kern="1200">
+                  <a:solidFill>
+                    <a:schemeClr val="tx1"/>
+                  </a:solidFill>
+                  <a:latin typeface="+mn-lt"/>
+                  <a:ea typeface="+mn-ea"/>
+                  <a:cs typeface="+mn-cs"/>
+                </a:defRPr>
+              </a:lvl9pPr>
+            </a:lstStyle>
+            <a:p>
+              <a:endParaRPr lang="en-US">
+                <a:solidFill>
+                  <a:srgbClr val="5F5F5F"/>
+                </a:solidFill>
+                <a:latin typeface="Segoe UI" panose="020B0502040204020203" pitchFamily="34" charset="0"/>
+                <a:cs typeface="Segoe UI" panose="020B0502040204020203" pitchFamily="34" charset="0"/>
+              </a:endParaRPr>
+            </a:p>
+          </p:txBody>
+        </p:sp>
+        <p:sp>
+          <p:nvSpPr>
+            <p:cNvPr id="7" name="Address Box" descr="&lt;SmartSettings&gt;&lt;SmartResize anchorLeft=&quot;Absolute&quot; anchorTop=&quot;Absolute&quot; anchorRight=&quot;Absolute&quot; anchorBottom=&quot;None&quot; /&gt;&lt;/SmartSettings&gt;">
+              <a:extLst>
+                <a:ext uri="{FF2B5EF4-FFF2-40B4-BE49-F238E27FC236}">
+                  <a16:creationId xmlns:a16="http://schemas.microsoft.com/office/drawing/2014/main" id="{8EB4CB97-5FB9-41F0-860C-2DA52BF7AA4B}"/>
+                </a:ext>
+              </a:extLst>
+            </p:cNvPr>
+            <p:cNvSpPr/>
+            <p:nvPr>
+              <p:custDataLst>
+                <p:tags r:id="rId6"/>
+              </p:custDataLst>
+            </p:nvPr>
+          </p:nvSpPr>
+          <p:spPr>
+            <a:xfrm>
+              <a:off x="1091235" y="1421038"/>
+              <a:ext cx="5993694" cy="155036"/>
+            </a:xfrm>
+            <a:prstGeom prst="rect">
+              <a:avLst/>
+            </a:prstGeom>
+            <a:solidFill>
+              <a:srgbClr val="FFFFFF"/>
+            </a:solidFill>
+            <a:ln w="6350">
+              <a:solidFill>
+                <a:srgbClr val="808080"/>
+              </a:solidFill>
+            </a:ln>
+          </p:spPr>
+          <p:style>
+            <a:lnRef idx="2">
+              <a:schemeClr val="accent1">
+                <a:shade val="50000"/>
+              </a:schemeClr>
+            </a:lnRef>
+            <a:fillRef idx="1">
+              <a:schemeClr val="accent1"/>
+            </a:fillRef>
+            <a:effectRef idx="0">
+              <a:schemeClr val="accent1"/>
+            </a:effectRef>
+            <a:fontRef idx="minor">
+              <a:schemeClr val="lt1"/>
+            </a:fontRef>
+          </p:style>
+          <p:txBody>
+            <a:bodyPr rot="0" spcFirstLastPara="0" vert="horz" wrap="square" lIns="237744" tIns="45720" rIns="91440" bIns="45720" numCol="1" spcCol="0" rtlCol="0" fromWordArt="0" anchor="ctr" anchorCtr="0" forceAA="0" compatLnSpc="1">
+              <a:prstTxWarp prst="textNoShape">
+                <a:avLst/>
+              </a:prstTxWarp>
+              <a:noAutofit/>
+            </a:bodyPr>
+            <a:lstStyle>
+              <a:defPPr>
+                <a:defRPr lang="en-US"/>
+              </a:defPPr>
+              <a:lvl1pPr marL="0" algn="l" defTabSz="914400" rtl="0" eaLnBrk="1" latinLnBrk="0" hangingPunct="1">
+                <a:defRPr sz="1800" kern="1200">
+                  <a:solidFill>
+                    <a:schemeClr val="lt1"/>
+                  </a:solidFill>
+                  <a:latin typeface="+mn-lt"/>
+                  <a:ea typeface="+mn-ea"/>
+                  <a:cs typeface="+mn-cs"/>
+                </a:defRPr>
+              </a:lvl1pPr>
+              <a:lvl2pPr marL="457200" algn="l" defTabSz="914400" rtl="0" eaLnBrk="1" latinLnBrk="0" hangingPunct="1">
+                <a:defRPr sz="1800" kern="1200">
+                  <a:solidFill>
+                    <a:schemeClr val="lt1"/>
+                  </a:solidFill>
+                  <a:latin typeface="+mn-lt"/>
+                  <a:ea typeface="+mn-ea"/>
+                  <a:cs typeface="+mn-cs"/>
+                </a:defRPr>
+              </a:lvl2pPr>
+              <a:lvl3pPr marL="914400" algn="l" defTabSz="914400" rtl="0" eaLnBrk="1" latinLnBrk="0" hangingPunct="1">
+                <a:defRPr sz="1800" kern="1200">
+                  <a:solidFill>
+                    <a:schemeClr val="lt1"/>
+                  </a:solidFill>
+                  <a:latin typeface="+mn-lt"/>
+                  <a:ea typeface="+mn-ea"/>
+                  <a:cs typeface="+mn-cs"/>
+                </a:defRPr>
+              </a:lvl3pPr>
+              <a:lvl4pPr marL="1371600" algn="l" defTabSz="914400" rtl="0" eaLnBrk="1" latinLnBrk="0" hangingPunct="1">
+                <a:defRPr sz="1800" kern="1200">
+                  <a:solidFill>
+                    <a:schemeClr val="lt1"/>
+                  </a:solidFill>
+                  <a:latin typeface="+mn-lt"/>
+                  <a:ea typeface="+mn-ea"/>
+                  <a:cs typeface="+mn-cs"/>
+                </a:defRPr>
+              </a:lvl4pPr>
+              <a:lvl5pPr marL="1828800" algn="l" defTabSz="914400" rtl="0" eaLnBrk="1" latinLnBrk="0" hangingPunct="1">
+                <a:defRPr sz="1800" kern="1200">
+                  <a:solidFill>
+                    <a:schemeClr val="lt1"/>
+                  </a:solidFill>
+                  <a:latin typeface="+mn-lt"/>
+                  <a:ea typeface="+mn-ea"/>
+                  <a:cs typeface="+mn-cs"/>
+                </a:defRPr>
+              </a:lvl5pPr>
+              <a:lvl6pPr marL="2286000" algn="l" defTabSz="914400" rtl="0" eaLnBrk="1" latinLnBrk="0" hangingPunct="1">
+                <a:defRPr sz="1800" kern="1200">
+                  <a:solidFill>
+                    <a:schemeClr val="lt1"/>
+                  </a:solidFill>
+                  <a:latin typeface="+mn-lt"/>
+                  <a:ea typeface="+mn-ea"/>
+                  <a:cs typeface="+mn-cs"/>
+                </a:defRPr>
+              </a:lvl6pPr>
+              <a:lvl7pPr marL="2743200" algn="l" defTabSz="914400" rtl="0" eaLnBrk="1" latinLnBrk="0" hangingPunct="1">
+                <a:defRPr sz="1800" kern="1200">
+                  <a:solidFill>
+                    <a:schemeClr val="lt1"/>
+                  </a:solidFill>
+                  <a:latin typeface="+mn-lt"/>
+                  <a:ea typeface="+mn-ea"/>
+                  <a:cs typeface="+mn-cs"/>
+                </a:defRPr>
+              </a:lvl7pPr>
+              <a:lvl8pPr marL="3200400" algn="l" defTabSz="914400" rtl="0" eaLnBrk="1" latinLnBrk="0" hangingPunct="1">
+                <a:defRPr sz="1800" kern="1200">
+                  <a:solidFill>
+                    <a:schemeClr val="lt1"/>
+                  </a:solidFill>
+                  <a:latin typeface="+mn-lt"/>
+                  <a:ea typeface="+mn-ea"/>
+                  <a:cs typeface="+mn-cs"/>
+                </a:defRPr>
+              </a:lvl8pPr>
+              <a:lvl9pPr marL="3657600" algn="l" defTabSz="914400" rtl="0" eaLnBrk="1" latinLnBrk="0" hangingPunct="1">
+                <a:defRPr sz="1800" kern="1200">
+                  <a:solidFill>
+                    <a:schemeClr val="lt1"/>
+                  </a:solidFill>
+                  <a:latin typeface="+mn-lt"/>
+                  <a:ea typeface="+mn-ea"/>
+                  <a:cs typeface="+mn-cs"/>
+                </a:defRPr>
+              </a:lvl9pPr>
+            </a:lstStyle>
+            <a:p>
+              <a:r>
+                <a:rPr lang="en-US" sz="900" noProof="1">
+                  <a:solidFill>
+                    <a:srgbClr val="5F5F5F"/>
+                  </a:solidFill>
+                  <a:latin typeface="Segoe UI" panose="020B0502040204020203" pitchFamily="34" charset="0"/>
+                  <a:cs typeface="Segoe UI" panose="020B0502040204020203" pitchFamily="34" charset="0"/>
+                </a:rPr>
+                <a:t>https://www.bevsbakery.com</a:t>
+              </a:r>
+            </a:p>
+          </p:txBody>
+        </p:sp>
+        <p:sp>
+          <p:nvSpPr>
+            <p:cNvPr id="8" name="Document Icon" descr="&lt;SmartSettings&gt;&lt;SmartResize anchorLeft=&quot;Absolute&quot; anchorTop=&quot;Absolute&quot; anchorRight=&quot;None&quot; anchorBottom=&quot;None&quot; /&gt;&lt;/SmartSettings&gt;">
+              <a:extLst>
+                <a:ext uri="{FF2B5EF4-FFF2-40B4-BE49-F238E27FC236}">
+                  <a16:creationId xmlns:a16="http://schemas.microsoft.com/office/drawing/2014/main" id="{7E644A02-15A1-43DB-81F0-5B4A41781A4D}"/>
+                </a:ext>
+              </a:extLst>
+            </p:cNvPr>
+            <p:cNvSpPr>
+              <a:spLocks noChangeAspect="1" noEditPoints="1"/>
+            </p:cNvSpPr>
+            <p:nvPr>
+              <p:custDataLst>
+                <p:tags r:id="rId7"/>
+              </p:custDataLst>
+            </p:nvPr>
+          </p:nvSpPr>
+          <p:spPr bwMode="auto">
+            <a:xfrm>
+              <a:off x="1133015" y="1455077"/>
+              <a:ext cx="51406" cy="86959"/>
+            </a:xfrm>
+            <a:custGeom>
+              <a:avLst/>
+              <a:gdLst>
+                <a:gd name="T0" fmla="*/ 153 w 260"/>
+                <a:gd name="T1" fmla="*/ 7 h 367"/>
+                <a:gd name="T2" fmla="*/ 153 w 260"/>
+                <a:gd name="T3" fmla="*/ 108 h 367"/>
+                <a:gd name="T4" fmla="*/ 253 w 260"/>
+                <a:gd name="T5" fmla="*/ 108 h 367"/>
+                <a:gd name="T6" fmla="*/ 0 w 260"/>
+                <a:gd name="T7" fmla="*/ 0 h 367"/>
+                <a:gd name="T8" fmla="*/ 0 w 260"/>
+                <a:gd name="T9" fmla="*/ 367 h 367"/>
+                <a:gd name="T10" fmla="*/ 260 w 260"/>
+                <a:gd name="T11" fmla="*/ 367 h 367"/>
+                <a:gd name="T12" fmla="*/ 260 w 260"/>
+                <a:gd name="T13" fmla="*/ 100 h 367"/>
+                <a:gd name="T14" fmla="*/ 161 w 260"/>
+                <a:gd name="T15" fmla="*/ 1 h 367"/>
+                <a:gd name="T16" fmla="*/ 0 w 260"/>
+                <a:gd name="T17" fmla="*/ 0 h 367"/>
+              </a:gdLst>
+              <a:ahLst/>
+              <a:cxnLst>
+                <a:cxn ang="0">
+                  <a:pos x="T0" y="T1"/>
+                </a:cxn>
+                <a:cxn ang="0">
+                  <a:pos x="T2" y="T3"/>
+                </a:cxn>
+                <a:cxn ang="0">
+                  <a:pos x="T4" y="T5"/>
+                </a:cxn>
+                <a:cxn ang="0">
+                  <a:pos x="T6" y="T7"/>
+                </a:cxn>
+                <a:cxn ang="0">
+                  <a:pos x="T8" y="T9"/>
+                </a:cxn>
+                <a:cxn ang="0">
+                  <a:pos x="T10" y="T11"/>
+                </a:cxn>
+                <a:cxn ang="0">
+                  <a:pos x="T12" y="T13"/>
+                </a:cxn>
+                <a:cxn ang="0">
+                  <a:pos x="T14" y="T15"/>
+                </a:cxn>
+                <a:cxn ang="0">
+                  <a:pos x="T16" y="T17"/>
+                </a:cxn>
+              </a:cxnLst>
+              <a:rect l="0" t="0" r="r" b="b"/>
+              <a:pathLst>
+                <a:path w="260" h="367">
+                  <a:moveTo>
+                    <a:pt x="153" y="7"/>
+                  </a:moveTo>
+                  <a:lnTo>
+                    <a:pt x="153" y="108"/>
+                  </a:lnTo>
+                  <a:lnTo>
+                    <a:pt x="253" y="108"/>
+                  </a:lnTo>
+                  <a:moveTo>
+                    <a:pt x="0" y="0"/>
+                  </a:moveTo>
+                  <a:lnTo>
+                    <a:pt x="0" y="367"/>
+                  </a:lnTo>
+                  <a:lnTo>
+                    <a:pt x="260" y="367"/>
+                  </a:lnTo>
+                  <a:lnTo>
+                    <a:pt x="260" y="100"/>
+                  </a:lnTo>
+                  <a:lnTo>
+                    <a:pt x="161" y="1"/>
+                  </a:lnTo>
+                  <a:lnTo>
+                    <a:pt x="0" y="0"/>
+                  </a:lnTo>
+                  <a:close/>
+                </a:path>
+              </a:pathLst>
+            </a:custGeom>
+            <a:noFill/>
+            <a:ln w="6350" cap="flat">
+              <a:solidFill>
+                <a:srgbClr val="808080"/>
+              </a:solidFill>
+              <a:prstDash val="solid"/>
+              <a:miter lim="800000"/>
+              <a:headEnd/>
+              <a:tailEnd/>
+            </a:ln>
+            <a:extLst>
+              <a:ext uri="{909E8E84-426E-40DD-AFC4-6F175D3DCCD1}">
+                <a14:hiddenFill xmlns:a14="http://schemas.microsoft.com/office/drawing/2010/main">
+                  <a:solidFill>
+                    <a:srgbClr val="FFFFFF"/>
+                  </a:solidFill>
+                </a14:hiddenFill>
+              </a:ext>
+            </a:extLst>
+          </p:spPr>
+          <p:txBody>
+            <a:bodyPr vert="horz" wrap="square" lIns="91440" tIns="45720" rIns="91440" bIns="45720" numCol="1" anchor="t" anchorCtr="0" compatLnSpc="1">
+              <a:prstTxWarp prst="textNoShape">
+                <a:avLst/>
+              </a:prstTxWarp>
+            </a:bodyPr>
+            <a:lstStyle>
+              <a:defPPr>
+                <a:defRPr lang="en-US"/>
+              </a:defPPr>
+              <a:lvl1pPr marL="0" algn="l" defTabSz="914400" rtl="0" eaLnBrk="1" latinLnBrk="0" hangingPunct="1">
+                <a:defRPr sz="1800" kern="1200">
+                  <a:solidFill>
+                    <a:schemeClr val="tx1"/>
+                  </a:solidFill>
+                  <a:latin typeface="+mn-lt"/>
+                  <a:ea typeface="+mn-ea"/>
+                  <a:cs typeface="+mn-cs"/>
+                </a:defRPr>
+              </a:lvl1pPr>
+              <a:lvl2pPr marL="457200" algn="l" defTabSz="914400" rtl="0" eaLnBrk="1" latinLnBrk="0" hangingPunct="1">
+                <a:defRPr sz="1800" kern="1200">
+                  <a:solidFill>
+                    <a:schemeClr val="tx1"/>
+                  </a:solidFill>
+                  <a:latin typeface="+mn-lt"/>
+                  <a:ea typeface="+mn-ea"/>
+                  <a:cs typeface="+mn-cs"/>
+                </a:defRPr>
+              </a:lvl2pPr>
+              <a:lvl3pPr marL="914400" algn="l" defTabSz="914400" rtl="0" eaLnBrk="1" latinLnBrk="0" hangingPunct="1">
+                <a:defRPr sz="1800" kern="1200">
+                  <a:solidFill>
+                    <a:schemeClr val="tx1"/>
+                  </a:solidFill>
+                  <a:latin typeface="+mn-lt"/>
+                  <a:ea typeface="+mn-ea"/>
+                  <a:cs typeface="+mn-cs"/>
+                </a:defRPr>
+              </a:lvl3pPr>
+              <a:lvl4pPr marL="1371600" algn="l" defTabSz="914400" rtl="0" eaLnBrk="1" latinLnBrk="0" hangingPunct="1">
+                <a:defRPr sz="1800" kern="1200">
+                  <a:solidFill>
+                    <a:schemeClr val="tx1"/>
+                  </a:solidFill>
+                  <a:latin typeface="+mn-lt"/>
+                  <a:ea typeface="+mn-ea"/>
+                  <a:cs typeface="+mn-cs"/>
+                </a:defRPr>
+              </a:lvl4pPr>
+              <a:lvl5pPr marL="1828800" algn="l" defTabSz="914400" rtl="0" eaLnBrk="1" latinLnBrk="0" hangingPunct="1">
+                <a:defRPr sz="1800" kern="1200">
+                  <a:solidFill>
+                    <a:schemeClr val="tx1"/>
+                  </a:solidFill>
+                  <a:latin typeface="+mn-lt"/>
+                  <a:ea typeface="+mn-ea"/>
+                  <a:cs typeface="+mn-cs"/>
+                </a:defRPr>
+              </a:lvl5pPr>
+              <a:lvl6pPr marL="2286000" algn="l" defTabSz="914400" rtl="0" eaLnBrk="1" latinLnBrk="0" hangingPunct="1">
+                <a:defRPr sz="1800" kern="1200">
+                  <a:solidFill>
+                    <a:schemeClr val="tx1"/>
+                  </a:solidFill>
+                  <a:latin typeface="+mn-lt"/>
+                  <a:ea typeface="+mn-ea"/>
+                  <a:cs typeface="+mn-cs"/>
+                </a:defRPr>
+              </a:lvl6pPr>
+              <a:lvl7pPr marL="2743200" algn="l" defTabSz="914400" rtl="0" eaLnBrk="1" latinLnBrk="0" hangingPunct="1">
+                <a:defRPr sz="1800" kern="1200">
+                  <a:solidFill>
+                    <a:schemeClr val="tx1"/>
+                  </a:solidFill>
+                  <a:latin typeface="+mn-lt"/>
+                  <a:ea typeface="+mn-ea"/>
+                  <a:cs typeface="+mn-cs"/>
+                </a:defRPr>
+              </a:lvl7pPr>
+              <a:lvl8pPr marL="3200400" algn="l" defTabSz="914400" rtl="0" eaLnBrk="1" latinLnBrk="0" hangingPunct="1">
+                <a:defRPr sz="1800" kern="1200">
+                  <a:solidFill>
+                    <a:schemeClr val="tx1"/>
+                  </a:solidFill>
+                  <a:latin typeface="+mn-lt"/>
+                  <a:ea typeface="+mn-ea"/>
+                  <a:cs typeface="+mn-cs"/>
+                </a:defRPr>
+              </a:lvl8pPr>
+              <a:lvl9pPr marL="3657600" algn="l" defTabSz="914400" rtl="0" eaLnBrk="1" latinLnBrk="0" hangingPunct="1">
+                <a:defRPr sz="1800" kern="1200">
+                  <a:solidFill>
+                    <a:schemeClr val="tx1"/>
+                  </a:solidFill>
+                  <a:latin typeface="+mn-lt"/>
+                  <a:ea typeface="+mn-ea"/>
+                  <a:cs typeface="+mn-cs"/>
+                </a:defRPr>
+              </a:lvl9pPr>
+            </a:lstStyle>
+            <a:p>
+              <a:endParaRPr lang="en-US">
+                <a:solidFill>
+                  <a:srgbClr val="5F5F5F"/>
+                </a:solidFill>
+                <a:latin typeface="Segoe UI" panose="020B0502040204020203" pitchFamily="34" charset="0"/>
+                <a:cs typeface="Segoe UI" panose="020B0502040204020203" pitchFamily="34" charset="0"/>
+              </a:endParaRPr>
+            </a:p>
+          </p:txBody>
+        </p:sp>
+        <p:grpSp>
+          <p:nvGrpSpPr>
+            <p:cNvPr id="9" name="Navigation Buttons">
+              <a:extLst>
+                <a:ext uri="{FF2B5EF4-FFF2-40B4-BE49-F238E27FC236}">
+                  <a16:creationId xmlns:a16="http://schemas.microsoft.com/office/drawing/2014/main" id="{806BE386-EF74-42E7-8CC8-8C02A27F7469}"/>
+                </a:ext>
+              </a:extLst>
+            </p:cNvPr>
+            <p:cNvGrpSpPr/>
+            <p:nvPr/>
+          </p:nvGrpSpPr>
+          <p:grpSpPr>
+            <a:xfrm>
+              <a:off x="664789" y="1442136"/>
+              <a:ext cx="351997" cy="112840"/>
+              <a:chOff x="664789" y="1442136"/>
+              <a:chExt cx="351997" cy="112840"/>
+            </a:xfrm>
+          </p:grpSpPr>
+          <p:sp>
+            <p:nvSpPr>
+              <p:cNvPr id="10" name="Back Button" descr="&lt;SmartSettings&gt;&lt;SmartResize anchorLeft=&quot;Absolute&quot; anchorTop=&quot;Absolute&quot; anchorRight=&quot;None&quot; anchorBottom=&quot;None&quot; /&gt;&lt;/SmartSettings&gt;">
+                <a:extLst>
+                  <a:ext uri="{FF2B5EF4-FFF2-40B4-BE49-F238E27FC236}">
+                    <a16:creationId xmlns:a16="http://schemas.microsoft.com/office/drawing/2014/main" id="{3CEF111E-BC05-453A-9032-B7DEE21B10A5}"/>
+                  </a:ext>
+                </a:extLst>
+              </p:cNvPr>
+              <p:cNvSpPr>
+                <a:spLocks noChangeAspect="1" noEditPoints="1"/>
+              </p:cNvSpPr>
+              <p:nvPr>
+                <p:custDataLst>
+                  <p:tags r:id="rId8"/>
+                </p:custDataLst>
+              </p:nvPr>
+            </p:nvSpPr>
+            <p:spPr bwMode="auto">
+              <a:xfrm>
+                <a:off x="664789" y="1459217"/>
+                <a:ext cx="83642" cy="78677"/>
+              </a:xfrm>
+              <a:custGeom>
+                <a:avLst/>
+                <a:gdLst>
+                  <a:gd name="T0" fmla="*/ 159 w 423"/>
+                  <a:gd name="T1" fmla="*/ 332 h 332"/>
+                  <a:gd name="T2" fmla="*/ 0 w 423"/>
+                  <a:gd name="T3" fmla="*/ 166 h 332"/>
+                  <a:gd name="T4" fmla="*/ 159 w 423"/>
+                  <a:gd name="T5" fmla="*/ 0 h 332"/>
+                  <a:gd name="T6" fmla="*/ 15 w 423"/>
+                  <a:gd name="T7" fmla="*/ 166 h 332"/>
+                  <a:gd name="T8" fmla="*/ 423 w 423"/>
+                  <a:gd name="T9" fmla="*/ 166 h 332"/>
+                </a:gdLst>
+                <a:ahLst/>
+                <a:cxnLst>
+                  <a:cxn ang="0">
+                    <a:pos x="T0" y="T1"/>
+                  </a:cxn>
+                  <a:cxn ang="0">
+                    <a:pos x="T2" y="T3"/>
+                  </a:cxn>
+                  <a:cxn ang="0">
+                    <a:pos x="T4" y="T5"/>
+                  </a:cxn>
+                  <a:cxn ang="0">
+                    <a:pos x="T6" y="T7"/>
+                  </a:cxn>
+                  <a:cxn ang="0">
+                    <a:pos x="T8" y="T9"/>
+                  </a:cxn>
+                </a:cxnLst>
+                <a:rect l="0" t="0" r="r" b="b"/>
+                <a:pathLst>
+                  <a:path w="423" h="332">
+                    <a:moveTo>
+                      <a:pt x="159" y="332"/>
+                    </a:moveTo>
+                    <a:lnTo>
+                      <a:pt x="0" y="166"/>
+                    </a:lnTo>
+                    <a:lnTo>
+                      <a:pt x="159" y="0"/>
+                    </a:lnTo>
+                    <a:moveTo>
+                      <a:pt x="15" y="166"/>
+                    </a:moveTo>
+                    <a:lnTo>
+                      <a:pt x="423" y="166"/>
+                    </a:lnTo>
+                  </a:path>
+                </a:pathLst>
+              </a:custGeom>
+              <a:noFill/>
+              <a:ln w="6350" cap="sq">
+                <a:solidFill>
+                  <a:srgbClr val="808080"/>
+                </a:solidFill>
+                <a:prstDash val="solid"/>
+                <a:miter lim="800000"/>
+                <a:headEnd/>
+                <a:tailEnd/>
+              </a:ln>
+              <a:extLst>
+                <a:ext uri="{909E8E84-426E-40DD-AFC4-6F175D3DCCD1}">
+                  <a14:hiddenFill xmlns:a14="http://schemas.microsoft.com/office/drawing/2010/main">
+                    <a:solidFill>
+                      <a:srgbClr val="FFFFFF"/>
+                    </a:solidFill>
+                  </a14:hiddenFill>
+                </a:ext>
+              </a:extLst>
+            </p:spPr>
+            <p:txBody>
+              <a:bodyPr vert="horz" wrap="square" lIns="91440" tIns="45720" rIns="91440" bIns="45720" numCol="1" anchor="t" anchorCtr="0" compatLnSpc="1">
+                <a:prstTxWarp prst="textNoShape">
+                  <a:avLst/>
+                </a:prstTxWarp>
+              </a:bodyPr>
+              <a:lstStyle>
+                <a:defPPr>
+                  <a:defRPr lang="en-US"/>
+                </a:defPPr>
+                <a:lvl1pPr marL="0" algn="l" defTabSz="914400" rtl="0" eaLnBrk="1" latinLnBrk="0" hangingPunct="1">
+                  <a:defRPr sz="1800" kern="1200">
+                    <a:solidFill>
+                      <a:schemeClr val="tx1"/>
+                    </a:solidFill>
+                    <a:latin typeface="+mn-lt"/>
+                    <a:ea typeface="+mn-ea"/>
+                    <a:cs typeface="+mn-cs"/>
+                  </a:defRPr>
+                </a:lvl1pPr>
+                <a:lvl2pPr marL="457200" algn="l" defTabSz="914400" rtl="0" eaLnBrk="1" latinLnBrk="0" hangingPunct="1">
+                  <a:defRPr sz="1800" kern="1200">
+                    <a:solidFill>
+                      <a:schemeClr val="tx1"/>
+                    </a:solidFill>
+                    <a:latin typeface="+mn-lt"/>
+                    <a:ea typeface="+mn-ea"/>
+                    <a:cs typeface="+mn-cs"/>
+                  </a:defRPr>
+                </a:lvl2pPr>
+                <a:lvl3pPr marL="914400" algn="l" defTabSz="914400" rtl="0" eaLnBrk="1" latinLnBrk="0" hangingPunct="1">
+                  <a:defRPr sz="1800" kern="1200">
+                    <a:solidFill>
+                      <a:schemeClr val="tx1"/>
+                    </a:solidFill>
+                    <a:latin typeface="+mn-lt"/>
+                    <a:ea typeface="+mn-ea"/>
+                    <a:cs typeface="+mn-cs"/>
+                  </a:defRPr>
+                </a:lvl3pPr>
+                <a:lvl4pPr marL="1371600" algn="l" defTabSz="914400" rtl="0" eaLnBrk="1" latinLnBrk="0" hangingPunct="1">
+                  <a:defRPr sz="1800" kern="1200">
+                    <a:solidFill>
+                      <a:schemeClr val="tx1"/>
+                    </a:solidFill>
+                    <a:latin typeface="+mn-lt"/>
+                    <a:ea typeface="+mn-ea"/>
+                    <a:cs typeface="+mn-cs"/>
+                  </a:defRPr>
+                </a:lvl4pPr>
+                <a:lvl5pPr marL="1828800" algn="l" defTabSz="914400" rtl="0" eaLnBrk="1" latinLnBrk="0" hangingPunct="1">
+                  <a:defRPr sz="1800" kern="1200">
+                    <a:solidFill>
+                      <a:schemeClr val="tx1"/>
+                    </a:solidFill>
+                    <a:latin typeface="+mn-lt"/>
+                    <a:ea typeface="+mn-ea"/>
+                    <a:cs typeface="+mn-cs"/>
+                  </a:defRPr>
+                </a:lvl5pPr>
+                <a:lvl6pPr marL="2286000" algn="l" defTabSz="914400" rtl="0" eaLnBrk="1" latinLnBrk="0" hangingPunct="1">
+                  <a:defRPr sz="1800" kern="1200">
+                    <a:solidFill>
+                      <a:schemeClr val="tx1"/>
+                    </a:solidFill>
+                    <a:latin typeface="+mn-lt"/>
+                    <a:ea typeface="+mn-ea"/>
+                    <a:cs typeface="+mn-cs"/>
+                  </a:defRPr>
+                </a:lvl6pPr>
+                <a:lvl7pPr marL="2743200" algn="l" defTabSz="914400" rtl="0" eaLnBrk="1" latinLnBrk="0" hangingPunct="1">
+                  <a:defRPr sz="1800" kern="1200">
+                    <a:solidFill>
+                      <a:schemeClr val="tx1"/>
+                    </a:solidFill>
+                    <a:latin typeface="+mn-lt"/>
+                    <a:ea typeface="+mn-ea"/>
+                    <a:cs typeface="+mn-cs"/>
+                  </a:defRPr>
+                </a:lvl7pPr>
+                <a:lvl8pPr marL="3200400" algn="l" defTabSz="914400" rtl="0" eaLnBrk="1" latinLnBrk="0" hangingPunct="1">
+                  <a:defRPr sz="1800" kern="1200">
+                    <a:solidFill>
+                      <a:schemeClr val="tx1"/>
+                    </a:solidFill>
+                    <a:latin typeface="+mn-lt"/>
+                    <a:ea typeface="+mn-ea"/>
+                    <a:cs typeface="+mn-cs"/>
+                  </a:defRPr>
+                </a:lvl8pPr>
+                <a:lvl9pPr marL="3657600" algn="l" defTabSz="914400" rtl="0" eaLnBrk="1" latinLnBrk="0" hangingPunct="1">
+                  <a:defRPr sz="1800" kern="1200">
+                    <a:solidFill>
+                      <a:schemeClr val="tx1"/>
+                    </a:solidFill>
+                    <a:latin typeface="+mn-lt"/>
+                    <a:ea typeface="+mn-ea"/>
+                    <a:cs typeface="+mn-cs"/>
+                  </a:defRPr>
+                </a:lvl9pPr>
+              </a:lstStyle>
+              <a:p>
+                <a:endParaRPr lang="en-US">
+                  <a:solidFill>
+                    <a:srgbClr val="5F5F5F"/>
+                  </a:solidFill>
+                  <a:latin typeface="Segoe UI" panose="020B0502040204020203" pitchFamily="34" charset="0"/>
+                  <a:cs typeface="Segoe UI" panose="020B0502040204020203" pitchFamily="34" charset="0"/>
+                </a:endParaRPr>
+              </a:p>
+            </p:txBody>
+          </p:sp>
+          <p:sp>
+            <p:nvSpPr>
+              <p:cNvPr id="11" name="Forward Button" descr="&lt;SmartSettings&gt;&lt;SmartResize anchorLeft=&quot;Absolute&quot; anchorTop=&quot;Absolute&quot; anchorRight=&quot;None&quot; anchorBottom=&quot;None&quot; /&gt;&lt;/SmartSettings&gt;">
+                <a:extLst>
+                  <a:ext uri="{FF2B5EF4-FFF2-40B4-BE49-F238E27FC236}">
+                    <a16:creationId xmlns:a16="http://schemas.microsoft.com/office/drawing/2014/main" id="{99B9E8F8-6836-4A4C-BB44-C9D5015A7FA6}"/>
+                  </a:ext>
+                </a:extLst>
+              </p:cNvPr>
+              <p:cNvSpPr>
+                <a:spLocks noChangeAspect="1" noEditPoints="1"/>
+              </p:cNvSpPr>
+              <p:nvPr>
+                <p:custDataLst>
+                  <p:tags r:id="rId9"/>
+                </p:custDataLst>
+              </p:nvPr>
+            </p:nvSpPr>
+            <p:spPr bwMode="auto">
+              <a:xfrm>
+                <a:off x="797223" y="1459218"/>
+                <a:ext cx="83642" cy="78677"/>
+              </a:xfrm>
+              <a:custGeom>
+                <a:avLst/>
+                <a:gdLst>
+                  <a:gd name="T0" fmla="*/ 265 w 423"/>
+                  <a:gd name="T1" fmla="*/ 0 h 332"/>
+                  <a:gd name="T2" fmla="*/ 423 w 423"/>
+                  <a:gd name="T3" fmla="*/ 166 h 332"/>
+                  <a:gd name="T4" fmla="*/ 265 w 423"/>
+                  <a:gd name="T5" fmla="*/ 332 h 332"/>
+                  <a:gd name="T6" fmla="*/ 408 w 423"/>
+                  <a:gd name="T7" fmla="*/ 166 h 332"/>
+                  <a:gd name="T8" fmla="*/ 0 w 423"/>
+                  <a:gd name="T9" fmla="*/ 166 h 332"/>
+                </a:gdLst>
+                <a:ahLst/>
+                <a:cxnLst>
+                  <a:cxn ang="0">
+                    <a:pos x="T0" y="T1"/>
+                  </a:cxn>
+                  <a:cxn ang="0">
+                    <a:pos x="T2" y="T3"/>
+                  </a:cxn>
+                  <a:cxn ang="0">
+                    <a:pos x="T4" y="T5"/>
+                  </a:cxn>
+                  <a:cxn ang="0">
+                    <a:pos x="T6" y="T7"/>
+                  </a:cxn>
+                  <a:cxn ang="0">
+                    <a:pos x="T8" y="T9"/>
+                  </a:cxn>
+                </a:cxnLst>
+                <a:rect l="0" t="0" r="r" b="b"/>
+                <a:pathLst>
+                  <a:path w="423" h="332">
+                    <a:moveTo>
+                      <a:pt x="265" y="0"/>
+                    </a:moveTo>
+                    <a:lnTo>
+                      <a:pt x="423" y="166"/>
+                    </a:lnTo>
+                    <a:lnTo>
+                      <a:pt x="265" y="332"/>
+                    </a:lnTo>
+                    <a:moveTo>
+                      <a:pt x="408" y="166"/>
+                    </a:moveTo>
+                    <a:lnTo>
+                      <a:pt x="0" y="166"/>
+                    </a:lnTo>
+                  </a:path>
+                </a:pathLst>
+              </a:custGeom>
+              <a:noFill/>
+              <a:ln w="6350" cap="sq">
+                <a:solidFill>
+                  <a:srgbClr val="808080"/>
+                </a:solidFill>
+                <a:prstDash val="solid"/>
+                <a:miter lim="800000"/>
+                <a:headEnd/>
+                <a:tailEnd/>
+              </a:ln>
+              <a:extLst>
+                <a:ext uri="{909E8E84-426E-40DD-AFC4-6F175D3DCCD1}">
+                  <a14:hiddenFill xmlns:a14="http://schemas.microsoft.com/office/drawing/2010/main">
+                    <a:solidFill>
+                      <a:srgbClr val="FFFFFF"/>
+                    </a:solidFill>
+                  </a14:hiddenFill>
+                </a:ext>
+              </a:extLst>
+            </p:spPr>
+            <p:txBody>
+              <a:bodyPr vert="horz" wrap="square" lIns="91440" tIns="45720" rIns="91440" bIns="45720" numCol="1" anchor="t" anchorCtr="0" compatLnSpc="1">
+                <a:prstTxWarp prst="textNoShape">
+                  <a:avLst/>
+                </a:prstTxWarp>
+              </a:bodyPr>
+              <a:lstStyle>
+                <a:defPPr>
+                  <a:defRPr lang="en-US"/>
+                </a:defPPr>
+                <a:lvl1pPr marL="0" algn="l" defTabSz="914400" rtl="0" eaLnBrk="1" latinLnBrk="0" hangingPunct="1">
+                  <a:defRPr sz="1800" kern="1200">
+                    <a:solidFill>
+                      <a:schemeClr val="tx1"/>
+                    </a:solidFill>
+                    <a:latin typeface="+mn-lt"/>
+                    <a:ea typeface="+mn-ea"/>
+                    <a:cs typeface="+mn-cs"/>
+                  </a:defRPr>
+                </a:lvl1pPr>
+                <a:lvl2pPr marL="457200" algn="l" defTabSz="914400" rtl="0" eaLnBrk="1" latinLnBrk="0" hangingPunct="1">
+                  <a:defRPr sz="1800" kern="1200">
+                    <a:solidFill>
+                      <a:schemeClr val="tx1"/>
+                    </a:solidFill>
+                    <a:latin typeface="+mn-lt"/>
+                    <a:ea typeface="+mn-ea"/>
+                    <a:cs typeface="+mn-cs"/>
+                  </a:defRPr>
+                </a:lvl2pPr>
+                <a:lvl3pPr marL="914400" algn="l" defTabSz="914400" rtl="0" eaLnBrk="1" latinLnBrk="0" hangingPunct="1">
+                  <a:defRPr sz="1800" kern="1200">
+                    <a:solidFill>
+                      <a:schemeClr val="tx1"/>
+                    </a:solidFill>
+                    <a:latin typeface="+mn-lt"/>
+                    <a:ea typeface="+mn-ea"/>
+                    <a:cs typeface="+mn-cs"/>
+                  </a:defRPr>
+                </a:lvl3pPr>
+                <a:lvl4pPr marL="1371600" algn="l" defTabSz="914400" rtl="0" eaLnBrk="1" latinLnBrk="0" hangingPunct="1">
+                  <a:defRPr sz="1800" kern="1200">
+                    <a:solidFill>
+                      <a:schemeClr val="tx1"/>
+                    </a:solidFill>
+                    <a:latin typeface="+mn-lt"/>
+                    <a:ea typeface="+mn-ea"/>
+                    <a:cs typeface="+mn-cs"/>
+                  </a:defRPr>
+                </a:lvl4pPr>
+                <a:lvl5pPr marL="1828800" algn="l" defTabSz="914400" rtl="0" eaLnBrk="1" latinLnBrk="0" hangingPunct="1">
+                  <a:defRPr sz="1800" kern="1200">
+                    <a:solidFill>
+                      <a:schemeClr val="tx1"/>
+                    </a:solidFill>
+                    <a:latin typeface="+mn-lt"/>
+                    <a:ea typeface="+mn-ea"/>
+                    <a:cs typeface="+mn-cs"/>
+                  </a:defRPr>
+                </a:lvl5pPr>
+                <a:lvl6pPr marL="2286000" algn="l" defTabSz="914400" rtl="0" eaLnBrk="1" latinLnBrk="0" hangingPunct="1">
+                  <a:defRPr sz="1800" kern="1200">
+                    <a:solidFill>
+                      <a:schemeClr val="tx1"/>
+                    </a:solidFill>
+                    <a:latin typeface="+mn-lt"/>
+                    <a:ea typeface="+mn-ea"/>
+                    <a:cs typeface="+mn-cs"/>
+                  </a:defRPr>
+                </a:lvl6pPr>
+                <a:lvl7pPr marL="2743200" algn="l" defTabSz="914400" rtl="0" eaLnBrk="1" latinLnBrk="0" hangingPunct="1">
+                  <a:defRPr sz="1800" kern="1200">
+                    <a:solidFill>
+                      <a:schemeClr val="tx1"/>
+                    </a:solidFill>
+                    <a:latin typeface="+mn-lt"/>
+                    <a:ea typeface="+mn-ea"/>
+                    <a:cs typeface="+mn-cs"/>
+                  </a:defRPr>
+                </a:lvl7pPr>
+                <a:lvl8pPr marL="3200400" algn="l" defTabSz="914400" rtl="0" eaLnBrk="1" latinLnBrk="0" hangingPunct="1">
+                  <a:defRPr sz="1800" kern="1200">
+                    <a:solidFill>
+                      <a:schemeClr val="tx1"/>
+                    </a:solidFill>
+                    <a:latin typeface="+mn-lt"/>
+                    <a:ea typeface="+mn-ea"/>
+                    <a:cs typeface="+mn-cs"/>
+                  </a:defRPr>
+                </a:lvl8pPr>
+                <a:lvl9pPr marL="3657600" algn="l" defTabSz="914400" rtl="0" eaLnBrk="1" latinLnBrk="0" hangingPunct="1">
+                  <a:defRPr sz="1800" kern="1200">
+                    <a:solidFill>
+                      <a:schemeClr val="tx1"/>
+                    </a:solidFill>
+                    <a:latin typeface="+mn-lt"/>
+                    <a:ea typeface="+mn-ea"/>
+                    <a:cs typeface="+mn-cs"/>
+                  </a:defRPr>
+                </a:lvl9pPr>
+              </a:lstStyle>
+              <a:p>
+                <a:endParaRPr lang="en-US">
+                  <a:solidFill>
+                    <a:srgbClr val="5F5F5F"/>
+                  </a:solidFill>
+                  <a:latin typeface="Segoe UI" panose="020B0502040204020203" pitchFamily="34" charset="0"/>
+                  <a:cs typeface="Segoe UI" panose="020B0502040204020203" pitchFamily="34" charset="0"/>
+                </a:endParaRPr>
+              </a:p>
+            </p:txBody>
+          </p:sp>
+          <p:sp>
+            <p:nvSpPr>
+              <p:cNvPr id="12" name="Reload Button" descr="&lt;SmartSettings&gt;&lt;SmartResize anchorLeft=&quot;Absolute&quot; anchorTop=&quot;Absolute&quot; anchorRight=&quot;None&quot; anchorBottom=&quot;None&quot; /&gt;&lt;/SmartSettings&gt;">
+                <a:extLst>
+                  <a:ext uri="{FF2B5EF4-FFF2-40B4-BE49-F238E27FC236}">
+                    <a16:creationId xmlns:a16="http://schemas.microsoft.com/office/drawing/2014/main" id="{43A4FA08-3DE6-4471-934F-62648166B7A3}"/>
+                  </a:ext>
+                </a:extLst>
+              </p:cNvPr>
+              <p:cNvSpPr>
+                <a:spLocks noChangeAspect="1" noEditPoints="1"/>
+              </p:cNvSpPr>
+              <p:nvPr>
+                <p:custDataLst>
+                  <p:tags r:id="rId10"/>
+                </p:custDataLst>
+              </p:nvPr>
+            </p:nvSpPr>
+            <p:spPr bwMode="auto">
+              <a:xfrm>
+                <a:off x="929658" y="1442136"/>
+                <a:ext cx="87128" cy="112840"/>
+              </a:xfrm>
+              <a:custGeom>
+                <a:avLst/>
+                <a:gdLst>
+                  <a:gd name="T0" fmla="*/ 441 w 441"/>
+                  <a:gd name="T1" fmla="*/ 7 h 474"/>
+                  <a:gd name="T2" fmla="*/ 441 w 441"/>
+                  <a:gd name="T3" fmla="*/ 144 h 474"/>
+                  <a:gd name="T4" fmla="*/ 296 w 441"/>
+                  <a:gd name="T5" fmla="*/ 144 h 474"/>
+                  <a:gd name="T6" fmla="*/ 438 w 441"/>
+                  <a:gd name="T7" fmla="*/ 309 h 474"/>
+                  <a:gd name="T8" fmla="*/ 166 w 441"/>
+                  <a:gd name="T9" fmla="*/ 434 h 474"/>
+                  <a:gd name="T10" fmla="*/ 41 w 441"/>
+                  <a:gd name="T11" fmla="*/ 162 h 474"/>
+                  <a:gd name="T12" fmla="*/ 313 w 441"/>
+                  <a:gd name="T13" fmla="*/ 37 h 474"/>
+                  <a:gd name="T14" fmla="*/ 428 w 441"/>
+                  <a:gd name="T15" fmla="*/ 139 h 474"/>
+                </a:gdLst>
+                <a:ahLst/>
+                <a:cxnLst>
+                  <a:cxn ang="0">
+                    <a:pos x="T0" y="T1"/>
+                  </a:cxn>
+                  <a:cxn ang="0">
+                    <a:pos x="T2" y="T3"/>
+                  </a:cxn>
+                  <a:cxn ang="0">
+                    <a:pos x="T4" y="T5"/>
+                  </a:cxn>
+                  <a:cxn ang="0">
+                    <a:pos x="T6" y="T7"/>
+                  </a:cxn>
+                  <a:cxn ang="0">
+                    <a:pos x="T8" y="T9"/>
+                  </a:cxn>
+                  <a:cxn ang="0">
+                    <a:pos x="T10" y="T11"/>
+                  </a:cxn>
+                  <a:cxn ang="0">
+                    <a:pos x="T12" y="T13"/>
+                  </a:cxn>
+                  <a:cxn ang="0">
+                    <a:pos x="T14" y="T15"/>
+                  </a:cxn>
+                </a:cxnLst>
+                <a:rect l="0" t="0" r="r" b="b"/>
+                <a:pathLst>
+                  <a:path w="441" h="474">
+                    <a:moveTo>
+                      <a:pt x="441" y="7"/>
+                    </a:moveTo>
+                    <a:lnTo>
+                      <a:pt x="441" y="144"/>
+                    </a:lnTo>
+                    <a:lnTo>
+                      <a:pt x="296" y="144"/>
+                    </a:lnTo>
+                    <a:moveTo>
+                      <a:pt x="438" y="309"/>
+                    </a:moveTo>
+                    <a:cubicBezTo>
+                      <a:pt x="397" y="418"/>
+                      <a:pt x="276" y="474"/>
+                      <a:pt x="166" y="434"/>
+                    </a:cubicBezTo>
+                    <a:cubicBezTo>
+                      <a:pt x="56" y="393"/>
+                      <a:pt x="0" y="271"/>
+                      <a:pt x="41" y="162"/>
+                    </a:cubicBezTo>
+                    <a:cubicBezTo>
+                      <a:pt x="82" y="52"/>
+                      <a:pt x="202" y="0"/>
+                      <a:pt x="313" y="37"/>
+                    </a:cubicBezTo>
+                    <a:cubicBezTo>
+                      <a:pt x="357" y="51"/>
+                      <a:pt x="398" y="91"/>
+                      <a:pt x="428" y="139"/>
+                    </a:cubicBezTo>
+                  </a:path>
+                </a:pathLst>
+              </a:custGeom>
+              <a:noFill/>
+              <a:ln w="6350" cap="flat">
+                <a:solidFill>
+                  <a:srgbClr val="808080"/>
+                </a:solidFill>
+                <a:prstDash val="solid"/>
+                <a:miter lim="800000"/>
+                <a:headEnd/>
+                <a:tailEnd/>
+              </a:ln>
+              <a:extLst>
+                <a:ext uri="{909E8E84-426E-40DD-AFC4-6F175D3DCCD1}">
+                  <a14:hiddenFill xmlns:a14="http://schemas.microsoft.com/office/drawing/2010/main">
+                    <a:solidFill>
+                      <a:srgbClr val="FFFFFF"/>
+                    </a:solidFill>
+                  </a14:hiddenFill>
+                </a:ext>
+              </a:extLst>
+            </p:spPr>
+            <p:txBody>
+              <a:bodyPr vert="horz" wrap="square" lIns="91440" tIns="45720" rIns="91440" bIns="45720" numCol="1" anchor="t" anchorCtr="0" compatLnSpc="1">
+                <a:prstTxWarp prst="textNoShape">
+                  <a:avLst/>
+                </a:prstTxWarp>
+              </a:bodyPr>
+              <a:lstStyle>
+                <a:defPPr>
+                  <a:defRPr lang="en-US"/>
+                </a:defPPr>
+                <a:lvl1pPr marL="0" algn="l" defTabSz="914400" rtl="0" eaLnBrk="1" latinLnBrk="0" hangingPunct="1">
+                  <a:defRPr sz="1800" kern="1200">
+                    <a:solidFill>
+                      <a:schemeClr val="tx1"/>
+                    </a:solidFill>
+                    <a:latin typeface="+mn-lt"/>
+                    <a:ea typeface="+mn-ea"/>
+                    <a:cs typeface="+mn-cs"/>
+                  </a:defRPr>
+                </a:lvl1pPr>
+                <a:lvl2pPr marL="457200" algn="l" defTabSz="914400" rtl="0" eaLnBrk="1" latinLnBrk="0" hangingPunct="1">
+                  <a:defRPr sz="1800" kern="1200">
+                    <a:solidFill>
+                      <a:schemeClr val="tx1"/>
+                    </a:solidFill>
+                    <a:latin typeface="+mn-lt"/>
+                    <a:ea typeface="+mn-ea"/>
+                    <a:cs typeface="+mn-cs"/>
+                  </a:defRPr>
+                </a:lvl2pPr>
+                <a:lvl3pPr marL="914400" algn="l" defTabSz="914400" rtl="0" eaLnBrk="1" latinLnBrk="0" hangingPunct="1">
+                  <a:defRPr sz="1800" kern="1200">
+                    <a:solidFill>
+                      <a:schemeClr val="tx1"/>
+                    </a:solidFill>
+                    <a:latin typeface="+mn-lt"/>
+                    <a:ea typeface="+mn-ea"/>
+                    <a:cs typeface="+mn-cs"/>
+                  </a:defRPr>
+                </a:lvl3pPr>
+                <a:lvl4pPr marL="1371600" algn="l" defTabSz="914400" rtl="0" eaLnBrk="1" latinLnBrk="0" hangingPunct="1">
+                  <a:defRPr sz="1800" kern="1200">
+                    <a:solidFill>
+                      <a:schemeClr val="tx1"/>
+                    </a:solidFill>
+                    <a:latin typeface="+mn-lt"/>
+                    <a:ea typeface="+mn-ea"/>
+                    <a:cs typeface="+mn-cs"/>
+                  </a:defRPr>
+                </a:lvl4pPr>
+                <a:lvl5pPr marL="1828800" algn="l" defTabSz="914400" rtl="0" eaLnBrk="1" latinLnBrk="0" hangingPunct="1">
+                  <a:defRPr sz="1800" kern="1200">
+                    <a:solidFill>
+                      <a:schemeClr val="tx1"/>
+                    </a:solidFill>
+                    <a:latin typeface="+mn-lt"/>
+                    <a:ea typeface="+mn-ea"/>
+                    <a:cs typeface="+mn-cs"/>
+                  </a:defRPr>
+                </a:lvl5pPr>
+                <a:lvl6pPr marL="2286000" algn="l" defTabSz="914400" rtl="0" eaLnBrk="1" latinLnBrk="0" hangingPunct="1">
+                  <a:defRPr sz="1800" kern="1200">
+                    <a:solidFill>
+                      <a:schemeClr val="tx1"/>
+                    </a:solidFill>
+                    <a:latin typeface="+mn-lt"/>
+                    <a:ea typeface="+mn-ea"/>
+                    <a:cs typeface="+mn-cs"/>
+                  </a:defRPr>
+                </a:lvl6pPr>
+                <a:lvl7pPr marL="2743200" algn="l" defTabSz="914400" rtl="0" eaLnBrk="1" latinLnBrk="0" hangingPunct="1">
+                  <a:defRPr sz="1800" kern="1200">
+                    <a:solidFill>
+                      <a:schemeClr val="tx1"/>
+                    </a:solidFill>
+                    <a:latin typeface="+mn-lt"/>
+                    <a:ea typeface="+mn-ea"/>
+                    <a:cs typeface="+mn-cs"/>
+                  </a:defRPr>
+                </a:lvl7pPr>
+                <a:lvl8pPr marL="3200400" algn="l" defTabSz="914400" rtl="0" eaLnBrk="1" latinLnBrk="0" hangingPunct="1">
+                  <a:defRPr sz="1800" kern="1200">
+                    <a:solidFill>
+                      <a:schemeClr val="tx1"/>
+                    </a:solidFill>
+                    <a:latin typeface="+mn-lt"/>
+                    <a:ea typeface="+mn-ea"/>
+                    <a:cs typeface="+mn-cs"/>
+                  </a:defRPr>
+                </a:lvl8pPr>
+                <a:lvl9pPr marL="3657600" algn="l" defTabSz="914400" rtl="0" eaLnBrk="1" latinLnBrk="0" hangingPunct="1">
+                  <a:defRPr sz="1800" kern="1200">
+                    <a:solidFill>
+                      <a:schemeClr val="tx1"/>
+                    </a:solidFill>
+                    <a:latin typeface="+mn-lt"/>
+                    <a:ea typeface="+mn-ea"/>
+                    <a:cs typeface="+mn-cs"/>
+                  </a:defRPr>
+                </a:lvl9pPr>
+              </a:lstStyle>
+              <a:p>
+                <a:endParaRPr lang="en-US">
+                  <a:solidFill>
+                    <a:srgbClr val="5F5F5F"/>
+                  </a:solidFill>
+                  <a:latin typeface="Segoe UI" panose="020B0502040204020203" pitchFamily="34" charset="0"/>
+                  <a:cs typeface="Segoe UI" panose="020B0502040204020203" pitchFamily="34" charset="0"/>
+                </a:endParaRPr>
+              </a:p>
+            </p:txBody>
+          </p:sp>
+        </p:grpSp>
+      </p:grpSp>
+      <p:pic>
+        <p:nvPicPr>
+          <p:cNvPr id="24" name="Picture 23">
+            <a:extLst>
+              <a:ext uri="{FF2B5EF4-FFF2-40B4-BE49-F238E27FC236}">
+                <a16:creationId xmlns:a16="http://schemas.microsoft.com/office/drawing/2014/main" id="{7A04D256-DE07-4749-94B1-8148D9D8993E}"/>
+              </a:ext>
+            </a:extLst>
+          </p:cNvPr>
+          <p:cNvPicPr>
+            <a:picLocks noChangeAspect="1"/>
+          </p:cNvPicPr>
+          <p:nvPr/>
+        </p:nvPicPr>
+        <p:blipFill>
+          <a:blip r:embed="rId12"/>
+          <a:stretch>
+            <a:fillRect/>
+          </a:stretch>
+        </p:blipFill>
+        <p:spPr>
+          <a:xfrm>
+            <a:off x="1020654" y="1179630"/>
+            <a:ext cx="876190" cy="183354"/>
+          </a:xfrm>
+          <a:prstGeom prst="rect">
+            <a:avLst/>
+          </a:prstGeom>
+        </p:spPr>
+      </p:pic>
+      <p:pic>
+        <p:nvPicPr>
+          <p:cNvPr id="26" name="Picture 25">
+            <a:extLst>
+              <a:ext uri="{FF2B5EF4-FFF2-40B4-BE49-F238E27FC236}">
+                <a16:creationId xmlns:a16="http://schemas.microsoft.com/office/drawing/2014/main" id="{7FBDC2E1-3D7E-47EA-A59E-553A882F42EB}"/>
+              </a:ext>
+            </a:extLst>
+          </p:cNvPr>
+          <p:cNvPicPr>
+            <a:picLocks noChangeAspect="1"/>
+          </p:cNvPicPr>
+          <p:nvPr/>
+        </p:nvPicPr>
+        <p:blipFill>
+          <a:blip r:embed="rId13"/>
+          <a:stretch>
+            <a:fillRect/>
+          </a:stretch>
+        </p:blipFill>
+        <p:spPr>
+          <a:xfrm>
+            <a:off x="1026842" y="1637037"/>
+            <a:ext cx="876190" cy="180486"/>
+          </a:xfrm>
+          <a:prstGeom prst="rect">
+            <a:avLst/>
+          </a:prstGeom>
+        </p:spPr>
+      </p:pic>
+      <p:pic>
+        <p:nvPicPr>
+          <p:cNvPr id="28" name="Picture 27" descr="A picture containing clock&#10;&#10;Description automatically generated">
+            <a:extLst>
+              <a:ext uri="{FF2B5EF4-FFF2-40B4-BE49-F238E27FC236}">
+                <a16:creationId xmlns:a16="http://schemas.microsoft.com/office/drawing/2014/main" id="{1B781F96-53BC-4E86-B6B1-98F49CC92DB6}"/>
+              </a:ext>
+            </a:extLst>
+          </p:cNvPr>
+          <p:cNvPicPr>
+            <a:picLocks noChangeAspect="1"/>
+          </p:cNvPicPr>
+          <p:nvPr/>
+        </p:nvPicPr>
+        <p:blipFill>
+          <a:blip r:embed="rId14"/>
+          <a:stretch>
+            <a:fillRect/>
+          </a:stretch>
+        </p:blipFill>
+        <p:spPr>
+          <a:xfrm>
+            <a:off x="5759325" y="731896"/>
+            <a:ext cx="798964" cy="1177960"/>
+          </a:xfrm>
+          <a:prstGeom prst="rect">
+            <a:avLst/>
+          </a:prstGeom>
+        </p:spPr>
+      </p:pic>
+      <p:pic>
+        <p:nvPicPr>
+          <p:cNvPr id="30" name="Picture 29">
+            <a:extLst>
+              <a:ext uri="{FF2B5EF4-FFF2-40B4-BE49-F238E27FC236}">
+                <a16:creationId xmlns:a16="http://schemas.microsoft.com/office/drawing/2014/main" id="{2AE70787-AA38-46AB-990A-23A73CB3F1FA}"/>
+              </a:ext>
+            </a:extLst>
+          </p:cNvPr>
+          <p:cNvPicPr>
+            <a:picLocks noChangeAspect="1"/>
+          </p:cNvPicPr>
+          <p:nvPr/>
+        </p:nvPicPr>
+        <p:blipFill>
+          <a:blip r:embed="rId15"/>
+          <a:stretch>
+            <a:fillRect/>
+          </a:stretch>
+        </p:blipFill>
+        <p:spPr>
+          <a:xfrm>
+            <a:off x="2624161" y="1177205"/>
+            <a:ext cx="1193651" cy="215873"/>
+          </a:xfrm>
+          <a:prstGeom prst="rect">
+            <a:avLst/>
+          </a:prstGeom>
+        </p:spPr>
+      </p:pic>
+      <p:pic>
+        <p:nvPicPr>
+          <p:cNvPr id="32" name="Picture 31">
+            <a:extLst>
+              <a:ext uri="{FF2B5EF4-FFF2-40B4-BE49-F238E27FC236}">
+                <a16:creationId xmlns:a16="http://schemas.microsoft.com/office/drawing/2014/main" id="{2B31CC00-2BAC-44A8-BBCE-78C8FC3CBC61}"/>
+              </a:ext>
+            </a:extLst>
+          </p:cNvPr>
+          <p:cNvPicPr>
+            <a:picLocks noChangeAspect="1"/>
+          </p:cNvPicPr>
+          <p:nvPr/>
+        </p:nvPicPr>
+        <p:blipFill>
+          <a:blip r:embed="rId16"/>
+          <a:stretch>
+            <a:fillRect/>
+          </a:stretch>
+        </p:blipFill>
+        <p:spPr>
+          <a:xfrm>
+            <a:off x="2624161" y="1622054"/>
+            <a:ext cx="1295238" cy="215873"/>
+          </a:xfrm>
+          <a:prstGeom prst="rect">
+            <a:avLst/>
+          </a:prstGeom>
+        </p:spPr>
+      </p:pic>
+      <p:pic>
+        <p:nvPicPr>
+          <p:cNvPr id="34" name="Picture 33">
+            <a:extLst>
+              <a:ext uri="{FF2B5EF4-FFF2-40B4-BE49-F238E27FC236}">
+                <a16:creationId xmlns:a16="http://schemas.microsoft.com/office/drawing/2014/main" id="{45ED4DA3-626C-4428-A448-2FEF610FE552}"/>
+              </a:ext>
+            </a:extLst>
+          </p:cNvPr>
+          <p:cNvPicPr>
+            <a:picLocks noChangeAspect="1"/>
+          </p:cNvPicPr>
+          <p:nvPr/>
+        </p:nvPicPr>
+        <p:blipFill>
+          <a:blip r:embed="rId17"/>
+          <a:stretch>
+            <a:fillRect/>
+          </a:stretch>
+        </p:blipFill>
+        <p:spPr>
+          <a:xfrm>
+            <a:off x="8933794" y="1751984"/>
+            <a:ext cx="990476" cy="165079"/>
+          </a:xfrm>
+          <a:prstGeom prst="rect">
+            <a:avLst/>
+          </a:prstGeom>
+        </p:spPr>
+      </p:pic>
+      <p:pic>
+        <p:nvPicPr>
+          <p:cNvPr id="36" name="Picture 35">
+            <a:extLst>
+              <a:ext uri="{FF2B5EF4-FFF2-40B4-BE49-F238E27FC236}">
+                <a16:creationId xmlns:a16="http://schemas.microsoft.com/office/drawing/2014/main" id="{1532AE4C-8A5A-4A34-B4FC-9C7418656E3D}"/>
+              </a:ext>
+            </a:extLst>
+          </p:cNvPr>
+          <p:cNvPicPr>
+            <a:picLocks noChangeAspect="1"/>
+          </p:cNvPicPr>
+          <p:nvPr/>
+        </p:nvPicPr>
+        <p:blipFill>
+          <a:blip r:embed="rId18"/>
+          <a:stretch>
+            <a:fillRect/>
+          </a:stretch>
+        </p:blipFill>
+        <p:spPr>
+          <a:xfrm>
+            <a:off x="8686014" y="1473917"/>
+            <a:ext cx="1447619" cy="203175"/>
+          </a:xfrm>
+          <a:prstGeom prst="rect">
+            <a:avLst/>
+          </a:prstGeom>
+        </p:spPr>
+      </p:pic>
+      <p:pic>
+        <p:nvPicPr>
+          <p:cNvPr id="38" name="Picture 37">
+            <a:extLst>
+              <a:ext uri="{FF2B5EF4-FFF2-40B4-BE49-F238E27FC236}">
+                <a16:creationId xmlns:a16="http://schemas.microsoft.com/office/drawing/2014/main" id="{797ED3E6-985E-4EFD-801F-55A75611782A}"/>
+              </a:ext>
+            </a:extLst>
+          </p:cNvPr>
+          <p:cNvPicPr>
+            <a:picLocks noChangeAspect="1"/>
+          </p:cNvPicPr>
+          <p:nvPr/>
+        </p:nvPicPr>
+        <p:blipFill>
+          <a:blip r:embed="rId19"/>
+          <a:stretch>
+            <a:fillRect/>
+          </a:stretch>
+        </p:blipFill>
+        <p:spPr>
+          <a:xfrm>
+            <a:off x="7629961" y="1158964"/>
+            <a:ext cx="1536508" cy="165079"/>
+          </a:xfrm>
+          <a:prstGeom prst="rect">
+            <a:avLst/>
+          </a:prstGeom>
+        </p:spPr>
+      </p:pic>
+      <p:pic>
+        <p:nvPicPr>
+          <p:cNvPr id="40" name="Picture 39">
+            <a:extLst>
+              <a:ext uri="{FF2B5EF4-FFF2-40B4-BE49-F238E27FC236}">
+                <a16:creationId xmlns:a16="http://schemas.microsoft.com/office/drawing/2014/main" id="{8D1802B5-3A3C-4668-95CC-266110D91EA0}"/>
+              </a:ext>
+            </a:extLst>
+          </p:cNvPr>
+          <p:cNvPicPr>
+            <a:picLocks noChangeAspect="1"/>
+          </p:cNvPicPr>
+          <p:nvPr/>
+        </p:nvPicPr>
+        <p:blipFill>
+          <a:blip r:embed="rId20"/>
+          <a:stretch>
+            <a:fillRect/>
+          </a:stretch>
+        </p:blipFill>
+        <p:spPr>
+          <a:xfrm>
+            <a:off x="9378239" y="1200957"/>
+            <a:ext cx="101587" cy="101587"/>
+          </a:xfrm>
+          <a:prstGeom prst="rect">
+            <a:avLst/>
+          </a:prstGeom>
+        </p:spPr>
+      </p:pic>
+      <p:pic>
+        <p:nvPicPr>
+          <p:cNvPr id="42" name="Picture 41">
+            <a:extLst>
+              <a:ext uri="{FF2B5EF4-FFF2-40B4-BE49-F238E27FC236}">
+                <a16:creationId xmlns:a16="http://schemas.microsoft.com/office/drawing/2014/main" id="{A56DF0A6-8B7A-4883-95A4-9D1DCBBE6FE9}"/>
+              </a:ext>
+            </a:extLst>
+          </p:cNvPr>
+          <p:cNvPicPr>
+            <a:picLocks noChangeAspect="1"/>
+          </p:cNvPicPr>
+          <p:nvPr/>
+        </p:nvPicPr>
+        <p:blipFill>
+          <a:blip r:embed="rId21"/>
+          <a:stretch>
+            <a:fillRect/>
+          </a:stretch>
+        </p:blipFill>
+        <p:spPr>
+          <a:xfrm>
+            <a:off x="8647167" y="850322"/>
+            <a:ext cx="1498413" cy="203175"/>
+          </a:xfrm>
+          <a:prstGeom prst="rect">
+            <a:avLst/>
+          </a:prstGeom>
+        </p:spPr>
+      </p:pic>
+      <p:pic>
+        <p:nvPicPr>
+          <p:cNvPr id="44" name="Picture 43">
+            <a:extLst>
+              <a:ext uri="{FF2B5EF4-FFF2-40B4-BE49-F238E27FC236}">
+                <a16:creationId xmlns:a16="http://schemas.microsoft.com/office/drawing/2014/main" id="{D6C02175-20EC-4E1B-8CA8-A270EF27D571}"/>
+              </a:ext>
+            </a:extLst>
+          </p:cNvPr>
+          <p:cNvPicPr>
+            <a:picLocks noChangeAspect="1"/>
+          </p:cNvPicPr>
+          <p:nvPr/>
+        </p:nvPicPr>
+        <p:blipFill>
+          <a:blip r:embed="rId22"/>
+          <a:stretch>
+            <a:fillRect/>
+          </a:stretch>
+        </p:blipFill>
+        <p:spPr>
+          <a:xfrm>
+            <a:off x="9761822" y="1163653"/>
+            <a:ext cx="1409524" cy="203175"/>
+          </a:xfrm>
+          <a:prstGeom prst="rect">
+            <a:avLst/>
+          </a:prstGeom>
+        </p:spPr>
+      </p:pic>
+      <p:pic>
+        <p:nvPicPr>
+          <p:cNvPr id="14" name="Picture 13" descr="A picture containing object, cake, indoor, colorful&#10;&#10;Description automatically generated">
+            <a:extLst>
+              <a:ext uri="{FF2B5EF4-FFF2-40B4-BE49-F238E27FC236}">
+                <a16:creationId xmlns:a16="http://schemas.microsoft.com/office/drawing/2014/main" id="{08CE405D-43AB-4953-A018-49ADD9D278D3}"/>
+              </a:ext>
+            </a:extLst>
+          </p:cNvPr>
+          <p:cNvPicPr>
+            <a:picLocks noChangeAspect="1"/>
+          </p:cNvPicPr>
+          <p:nvPr/>
+        </p:nvPicPr>
+        <p:blipFill>
+          <a:blip r:embed="rId23"/>
+          <a:stretch>
+            <a:fillRect/>
+          </a:stretch>
+        </p:blipFill>
+        <p:spPr>
+          <a:xfrm>
+            <a:off x="5759325" y="2250947"/>
+            <a:ext cx="5838095" cy="3885714"/>
+          </a:xfrm>
+          <a:prstGeom prst="rect">
+            <a:avLst/>
+          </a:prstGeom>
+        </p:spPr>
+      </p:pic>
+      <p:pic>
+        <p:nvPicPr>
+          <p:cNvPr id="16" name="Picture 15" descr="A cake sitting on top of a table&#10;&#10;Description automatically generated">
+            <a:extLst>
+              <a:ext uri="{FF2B5EF4-FFF2-40B4-BE49-F238E27FC236}">
+                <a16:creationId xmlns:a16="http://schemas.microsoft.com/office/drawing/2014/main" id="{29F1BDB9-ED58-4828-B6E5-A058B2841668}"/>
+              </a:ext>
+            </a:extLst>
+          </p:cNvPr>
+          <p:cNvPicPr>
+            <a:picLocks noChangeAspect="1"/>
+          </p:cNvPicPr>
+          <p:nvPr/>
+        </p:nvPicPr>
+        <p:blipFill>
+          <a:blip r:embed="rId24"/>
+          <a:stretch>
+            <a:fillRect/>
+          </a:stretch>
+        </p:blipFill>
+        <p:spPr>
+          <a:xfrm>
+            <a:off x="485199" y="3429000"/>
+            <a:ext cx="3310841" cy="2514600"/>
+          </a:xfrm>
+          <a:prstGeom prst="rect">
+            <a:avLst/>
+          </a:prstGeom>
+        </p:spPr>
+      </p:pic>
+      <p:pic>
+        <p:nvPicPr>
+          <p:cNvPr id="18" name="Picture 17">
+            <a:extLst>
+              <a:ext uri="{FF2B5EF4-FFF2-40B4-BE49-F238E27FC236}">
+                <a16:creationId xmlns:a16="http://schemas.microsoft.com/office/drawing/2014/main" id="{434A6998-44D0-4393-A6FB-713E8D3D9564}"/>
+              </a:ext>
+            </a:extLst>
+          </p:cNvPr>
+          <p:cNvPicPr>
+            <a:picLocks noChangeAspect="1"/>
+          </p:cNvPicPr>
+          <p:nvPr/>
+        </p:nvPicPr>
+        <p:blipFill>
+          <a:blip r:embed="rId25"/>
+          <a:stretch>
+            <a:fillRect/>
+          </a:stretch>
+        </p:blipFill>
+        <p:spPr>
+          <a:xfrm>
+            <a:off x="4345465" y="2716125"/>
+            <a:ext cx="3542857" cy="241270"/>
+          </a:xfrm>
+          <a:prstGeom prst="rect">
+            <a:avLst/>
+          </a:prstGeom>
+        </p:spPr>
+      </p:pic>
+      <p:pic>
+        <p:nvPicPr>
+          <p:cNvPr id="20" name="Picture 19">
+            <a:extLst>
+              <a:ext uri="{FF2B5EF4-FFF2-40B4-BE49-F238E27FC236}">
+                <a16:creationId xmlns:a16="http://schemas.microsoft.com/office/drawing/2014/main" id="{66EC7639-E343-4DAA-964A-27E3E267D53A}"/>
+              </a:ext>
+            </a:extLst>
+          </p:cNvPr>
+          <p:cNvPicPr>
+            <a:picLocks noChangeAspect="1"/>
+          </p:cNvPicPr>
+          <p:nvPr/>
+        </p:nvPicPr>
+        <p:blipFill>
+          <a:blip r:embed="rId26"/>
+          <a:stretch>
+            <a:fillRect/>
+          </a:stretch>
+        </p:blipFill>
+        <p:spPr>
+          <a:xfrm>
+            <a:off x="4345465" y="3510297"/>
+            <a:ext cx="5231746" cy="241270"/>
+          </a:xfrm>
+          <a:prstGeom prst="rect">
+            <a:avLst/>
+          </a:prstGeom>
+        </p:spPr>
+      </p:pic>
+      <p:pic>
+        <p:nvPicPr>
+          <p:cNvPr id="25" name="Picture 24" descr="A picture containing drawing, knife&#10;&#10;Description automatically generated">
+            <a:extLst>
+              <a:ext uri="{FF2B5EF4-FFF2-40B4-BE49-F238E27FC236}">
+                <a16:creationId xmlns:a16="http://schemas.microsoft.com/office/drawing/2014/main" id="{B6ACB306-19FC-47B1-B483-66A903259E97}"/>
+              </a:ext>
+            </a:extLst>
+          </p:cNvPr>
+          <p:cNvPicPr>
+            <a:picLocks noChangeAspect="1"/>
+          </p:cNvPicPr>
+          <p:nvPr/>
+        </p:nvPicPr>
+        <p:blipFill>
+          <a:blip r:embed="rId27"/>
+          <a:stretch>
+            <a:fillRect/>
+          </a:stretch>
+        </p:blipFill>
+        <p:spPr>
+          <a:xfrm>
+            <a:off x="5295315" y="4332508"/>
+            <a:ext cx="1726984" cy="634921"/>
+          </a:xfrm>
+          <a:prstGeom prst="rect">
+            <a:avLst/>
+          </a:prstGeom>
+        </p:spPr>
+      </p:pic>
+      <p:pic>
+        <p:nvPicPr>
+          <p:cNvPr id="33" name="Picture 32">
+            <a:extLst>
+              <a:ext uri="{FF2B5EF4-FFF2-40B4-BE49-F238E27FC236}">
+                <a16:creationId xmlns:a16="http://schemas.microsoft.com/office/drawing/2014/main" id="{56462F9D-AB34-4943-8540-695ADF4312E0}"/>
+              </a:ext>
+            </a:extLst>
+          </p:cNvPr>
+          <p:cNvPicPr>
+            <a:picLocks noChangeAspect="1"/>
+          </p:cNvPicPr>
+          <p:nvPr/>
+        </p:nvPicPr>
+        <p:blipFill>
+          <a:blip r:embed="rId28"/>
+          <a:stretch>
+            <a:fillRect/>
+          </a:stretch>
+        </p:blipFill>
+        <p:spPr>
+          <a:xfrm>
+            <a:off x="5327746" y="3321063"/>
+            <a:ext cx="1536508" cy="215873"/>
+          </a:xfrm>
+          <a:prstGeom prst="rect">
+            <a:avLst/>
+          </a:prstGeom>
+        </p:spPr>
+      </p:pic>
+      <p:pic>
+        <p:nvPicPr>
+          <p:cNvPr id="37" name="Picture 36">
+            <a:extLst>
+              <a:ext uri="{FF2B5EF4-FFF2-40B4-BE49-F238E27FC236}">
+                <a16:creationId xmlns:a16="http://schemas.microsoft.com/office/drawing/2014/main" id="{6F83A971-72A0-4164-B362-EEA91C38F281}"/>
+              </a:ext>
+            </a:extLst>
+          </p:cNvPr>
+          <p:cNvPicPr>
+            <a:picLocks noChangeAspect="1"/>
+          </p:cNvPicPr>
+          <p:nvPr/>
+        </p:nvPicPr>
+        <p:blipFill>
+          <a:blip r:embed="rId28"/>
+          <a:stretch>
+            <a:fillRect/>
+          </a:stretch>
+        </p:blipFill>
+        <p:spPr>
+          <a:xfrm>
+            <a:off x="5390553" y="4542031"/>
+            <a:ext cx="1536508" cy="215873"/>
           </a:xfrm>
           <a:prstGeom prst="rect">
             <a:avLst/>
@@ -8817,7 +11323,7 @@
     </p:spTree>
     <p:extLst>
       <p:ext uri="{BB962C8B-B14F-4D97-AF65-F5344CB8AC3E}">
-        <p14:creationId xmlns:p14="http://schemas.microsoft.com/office/powerpoint/2010/main" val="4196731743"/>
+        <p14:creationId xmlns:p14="http://schemas.microsoft.com/office/powerpoint/2010/main" val="4008607583"/>
       </p:ext>
     </p:extLst>
   </p:cSld>
@@ -8839,9 +11345,69 @@
 </p:tagLst>
 </file>
 
+<file path=ppt/tags/tag11.xml><?xml version="1.0" encoding="utf-8"?>
+<p:tagLst xmlns:a="http://schemas.openxmlformats.org/drawingml/2006/main" xmlns:r="http://schemas.openxmlformats.org/officeDocument/2006/relationships" xmlns:p="http://schemas.openxmlformats.org/presentationml/2006/main">
+  <p:tag name="SMARTSETTINGSHASH" val="PWOa7bLCMN/NfWse0OkDrDXWtXjrMvC+/KEnGxnzoq0="/>
+</p:tagLst>
+</file>
+
+<file path=ppt/tags/tag12.xml><?xml version="1.0" encoding="utf-8"?>
+<p:tagLst xmlns:a="http://schemas.openxmlformats.org/drawingml/2006/main" xmlns:r="http://schemas.openxmlformats.org/officeDocument/2006/relationships" xmlns:p="http://schemas.openxmlformats.org/presentationml/2006/main">
+  <p:tag name="SMARTSETTINGSHASH" val="xZU/W0IqlvXPkJ37/hSWg5jSIFh0KZmI7sT1syyiYH8="/>
+</p:tagLst>
+</file>
+
+<file path=ppt/tags/tag13.xml><?xml version="1.0" encoding="utf-8"?>
+<p:tagLst xmlns:a="http://schemas.openxmlformats.org/drawingml/2006/main" xmlns:r="http://schemas.openxmlformats.org/officeDocument/2006/relationships" xmlns:p="http://schemas.openxmlformats.org/presentationml/2006/main">
+  <p:tag name="SMARTSETTINGSHASH" val="SB3bqgv5ghGJknk/m+/9EdPMDkanH9eNosaoBtCx42Q="/>
+</p:tagLst>
+</file>
+
+<file path=ppt/tags/tag14.xml><?xml version="1.0" encoding="utf-8"?>
+<p:tagLst xmlns:a="http://schemas.openxmlformats.org/drawingml/2006/main" xmlns:r="http://schemas.openxmlformats.org/officeDocument/2006/relationships" xmlns:p="http://schemas.openxmlformats.org/presentationml/2006/main">
+  <p:tag name="SMARTSETTINGSHASH" val="xscEFkRiZvbxLfN1YzQGPp4nKBgtuPrjp3QiTCcMWwM="/>
+</p:tagLst>
+</file>
+
+<file path=ppt/tags/tag15.xml><?xml version="1.0" encoding="utf-8"?>
+<p:tagLst xmlns:a="http://schemas.openxmlformats.org/drawingml/2006/main" xmlns:r="http://schemas.openxmlformats.org/officeDocument/2006/relationships" xmlns:p="http://schemas.openxmlformats.org/presentationml/2006/main">
+  <p:tag name="SMARTSETTINGSHASH" val="xscEFkRiZvbxLfN1YzQGPp4nKBgtuPrjp3QiTCcMWwM="/>
+</p:tagLst>
+</file>
+
+<file path=ppt/tags/tag16.xml><?xml version="1.0" encoding="utf-8"?>
+<p:tagLst xmlns:a="http://schemas.openxmlformats.org/drawingml/2006/main" xmlns:r="http://schemas.openxmlformats.org/officeDocument/2006/relationships" xmlns:p="http://schemas.openxmlformats.org/presentationml/2006/main">
+  <p:tag name="SMARTSETTINGSHASH" val="SB3bqgv5ghGJknk/m+/9EdPMDkanH9eNosaoBtCx42Q="/>
+</p:tagLst>
+</file>
+
+<file path=ppt/tags/tag17.xml><?xml version="1.0" encoding="utf-8"?>
+<p:tagLst xmlns:a="http://schemas.openxmlformats.org/drawingml/2006/main" xmlns:r="http://schemas.openxmlformats.org/officeDocument/2006/relationships" xmlns:p="http://schemas.openxmlformats.org/presentationml/2006/main">
+  <p:tag name="SMARTSETTINGSHASH" val="IDSg7uxH1Z/iSOkBSMZyie/SGkHlLE2okQSpqFhp1Ac="/>
+</p:tagLst>
+</file>
+
+<file path=ppt/tags/tag18.xml><?xml version="1.0" encoding="utf-8"?>
+<p:tagLst xmlns:a="http://schemas.openxmlformats.org/drawingml/2006/main" xmlns:r="http://schemas.openxmlformats.org/officeDocument/2006/relationships" xmlns:p="http://schemas.openxmlformats.org/presentationml/2006/main">
+  <p:tag name="SMARTSETTINGSHASH" val="IDSg7uxH1Z/iSOkBSMZyie/SGkHlLE2okQSpqFhp1Ac="/>
+</p:tagLst>
+</file>
+
+<file path=ppt/tags/tag19.xml><?xml version="1.0" encoding="utf-8"?>
+<p:tagLst xmlns:a="http://schemas.openxmlformats.org/drawingml/2006/main" xmlns:r="http://schemas.openxmlformats.org/officeDocument/2006/relationships" xmlns:p="http://schemas.openxmlformats.org/presentationml/2006/main">
+  <p:tag name="SMARTSETTINGSHASH" val="IDSg7uxH1Z/iSOkBSMZyie/SGkHlLE2okQSpqFhp1Ac="/>
+</p:tagLst>
+</file>
+
 <file path=ppt/tags/tag2.xml><?xml version="1.0" encoding="utf-8"?>
 <p:tagLst xmlns:a="http://schemas.openxmlformats.org/drawingml/2006/main" xmlns:r="http://schemas.openxmlformats.org/officeDocument/2006/relationships" xmlns:p="http://schemas.openxmlformats.org/presentationml/2006/main">
   <p:tag name="SMARTSETTINGSHASH" val="xZU/W0IqlvXPkJ37/hSWg5jSIFh0KZmI7sT1syyiYH8="/>
+</p:tagLst>
+</file>
+
+<file path=ppt/tags/tag20.xml><?xml version="1.0" encoding="utf-8"?>
+<p:tagLst xmlns:a="http://schemas.openxmlformats.org/drawingml/2006/main" xmlns:r="http://schemas.openxmlformats.org/officeDocument/2006/relationships" xmlns:p="http://schemas.openxmlformats.org/presentationml/2006/main">
+  <p:tag name="SMARTSETTINGSHASH" val="IDSg7uxH1Z/iSOkBSMZyie/SGkHlLE2okQSpqFhp1Ac="/>
 </p:tagLst>
 </file>
 

</xml_diff>